<commit_message>
Cập nhật cho bài giữa kì
</commit_message>
<xml_diff>
--- a/Documents/Tuan5/Nhom_3_Tuan_5.pptx
+++ b/Documents/Tuan5/Nhom_3_Tuan_5.pptx
@@ -16,12 +16,13 @@
     <p:sldId id="326" r:id="rId10"/>
     <p:sldId id="327" r:id="rId11"/>
     <p:sldId id="328" r:id="rId12"/>
-    <p:sldId id="331" r:id="rId13"/>
-    <p:sldId id="332" r:id="rId14"/>
-    <p:sldId id="333" r:id="rId15"/>
-    <p:sldId id="334" r:id="rId16"/>
-    <p:sldId id="335" r:id="rId17"/>
-    <p:sldId id="321" r:id="rId18"/>
+    <p:sldId id="329" r:id="rId13"/>
+    <p:sldId id="330" r:id="rId14"/>
+    <p:sldId id="331" r:id="rId15"/>
+    <p:sldId id="332" r:id="rId16"/>
+    <p:sldId id="333" r:id="rId17"/>
+    <p:sldId id="334" r:id="rId18"/>
+    <p:sldId id="321" r:id="rId19"/>
   </p:sldIdLst>
   <p:sldSz cx="12192000" cy="6858000"/>
   <p:notesSz cx="6858000" cy="9144000"/>
@@ -128,6 +129,1004 @@
 </p:presentation>
 </file>
 
+<file path=ppt/charts/chart1.xml><?xml version="1.0" encoding="utf-8"?>
+<c:chartSpace xmlns:c="http://schemas.openxmlformats.org/drawingml/2006/chart" xmlns:a="http://schemas.openxmlformats.org/drawingml/2006/main" xmlns:r="http://schemas.openxmlformats.org/officeDocument/2006/relationships" xmlns:c16r2="http://schemas.microsoft.com/office/drawing/2015/06/chart">
+  <c:date1904 val="0"/>
+  <c:lang val="en-US"/>
+  <c:roundedCorners val="0"/>
+  <mc:AlternateContent xmlns:mc="http://schemas.openxmlformats.org/markup-compatibility/2006">
+    <mc:Choice xmlns:c14="http://schemas.microsoft.com/office/drawing/2007/8/2/chart" Requires="c14">
+      <c14:style val="102"/>
+    </mc:Choice>
+    <mc:Fallback>
+      <c:style val="2"/>
+    </mc:Fallback>
+  </mc:AlternateContent>
+  <c:chart>
+    <c:title>
+      <c:layout/>
+      <c:overlay val="0"/>
+      <c:spPr>
+        <a:noFill/>
+        <a:ln>
+          <a:noFill/>
+        </a:ln>
+        <a:effectLst/>
+      </c:spPr>
+      <c:txPr>
+        <a:bodyPr rot="0" spcFirstLastPara="1" vertOverflow="ellipsis" vert="horz" wrap="square" anchor="ctr" anchorCtr="1"/>
+        <a:lstStyle/>
+        <a:p>
+          <a:pPr>
+            <a:defRPr sz="1400" b="0" i="0" u="none" strike="noStrike" kern="1200" spc="0" baseline="0">
+              <a:solidFill>
+                <a:schemeClr val="tx1">
+                  <a:lumMod val="65000"/>
+                  <a:lumOff val="35000"/>
+                </a:schemeClr>
+              </a:solidFill>
+              <a:latin typeface="+mn-lt"/>
+              <a:ea typeface="+mn-ea"/>
+              <a:cs typeface="+mn-cs"/>
+            </a:defRPr>
+          </a:pPr>
+          <a:endParaRPr lang="en-US"/>
+        </a:p>
+      </c:txPr>
+    </c:title>
+    <c:autoTitleDeleted val="0"/>
+    <c:plotArea>
+      <c:layout/>
+      <c:lineChart>
+        <c:grouping val="standard"/>
+        <c:varyColors val="0"/>
+        <c:ser>
+          <c:idx val="0"/>
+          <c:order val="0"/>
+          <c:tx>
+            <c:strRef>
+              <c:f>User!$L$6</c:f>
+              <c:strCache>
+                <c:ptCount val="1"/>
+                <c:pt idx="0">
+                  <c:v>Tiến độ</c:v>
+                </c:pt>
+              </c:strCache>
+            </c:strRef>
+          </c:tx>
+          <c:spPr>
+            <a:ln w="28575" cap="rnd">
+              <a:solidFill>
+                <a:schemeClr val="accent1"/>
+              </a:solidFill>
+              <a:round/>
+            </a:ln>
+            <a:effectLst/>
+          </c:spPr>
+          <c:marker>
+            <c:symbol val="none"/>
+          </c:marker>
+          <c:cat>
+            <c:strRef>
+              <c:f>User!$K$7:$K$16</c:f>
+              <c:strCache>
+                <c:ptCount val="10"/>
+                <c:pt idx="0">
+                  <c:v>Sprint3</c:v>
+                </c:pt>
+                <c:pt idx="1">
+                  <c:v>Sprint4</c:v>
+                </c:pt>
+                <c:pt idx="2">
+                  <c:v>Sprint5</c:v>
+                </c:pt>
+                <c:pt idx="3">
+                  <c:v>Sprint6</c:v>
+                </c:pt>
+                <c:pt idx="4">
+                  <c:v>Sprint7</c:v>
+                </c:pt>
+                <c:pt idx="5">
+                  <c:v>Sprint8</c:v>
+                </c:pt>
+                <c:pt idx="6">
+                  <c:v>Sprint9</c:v>
+                </c:pt>
+                <c:pt idx="7">
+                  <c:v>Sprint10</c:v>
+                </c:pt>
+                <c:pt idx="8">
+                  <c:v>Sprint11</c:v>
+                </c:pt>
+                <c:pt idx="9">
+                  <c:v>Sprint12</c:v>
+                </c:pt>
+              </c:strCache>
+            </c:strRef>
+          </c:cat>
+          <c:val>
+            <c:numRef>
+              <c:f>User!$L$7:$L$16</c:f>
+              <c:numCache>
+                <c:formatCode>General</c:formatCode>
+                <c:ptCount val="10"/>
+                <c:pt idx="0">
+                  <c:v>52</c:v>
+                </c:pt>
+                <c:pt idx="1">
+                  <c:v>41.6</c:v>
+                </c:pt>
+                <c:pt idx="2">
+                  <c:v>40</c:v>
+                </c:pt>
+                <c:pt idx="3">
+                  <c:v>37</c:v>
+                </c:pt>
+                <c:pt idx="4">
+                  <c:v>34</c:v>
+                </c:pt>
+              </c:numCache>
+            </c:numRef>
+          </c:val>
+          <c:smooth val="0"/>
+          <c:extLst>
+            <c:ext xmlns:c16="http://schemas.microsoft.com/office/drawing/2014/chart" uri="{C3380CC4-5D6E-409C-BE32-E72D297353CC}">
+              <c16:uniqueId val="{00000000-CE72-4BD1-9B55-13319E1D717B}"/>
+            </c:ext>
+          </c:extLst>
+        </c:ser>
+        <c:ser>
+          <c:idx val="1"/>
+          <c:order val="1"/>
+          <c:tx>
+            <c:strRef>
+              <c:f>User!$M$6</c:f>
+              <c:strCache>
+                <c:ptCount val="1"/>
+                <c:pt idx="0">
+                  <c:v>Mong muốn</c:v>
+                </c:pt>
+              </c:strCache>
+            </c:strRef>
+          </c:tx>
+          <c:spPr>
+            <a:ln w="28575" cap="rnd">
+              <a:solidFill>
+                <a:schemeClr val="accent2"/>
+              </a:solidFill>
+              <a:round/>
+            </a:ln>
+            <a:effectLst/>
+          </c:spPr>
+          <c:marker>
+            <c:symbol val="none"/>
+          </c:marker>
+          <c:cat>
+            <c:strRef>
+              <c:f>User!$K$7:$K$16</c:f>
+              <c:strCache>
+                <c:ptCount val="10"/>
+                <c:pt idx="0">
+                  <c:v>Sprint3</c:v>
+                </c:pt>
+                <c:pt idx="1">
+                  <c:v>Sprint4</c:v>
+                </c:pt>
+                <c:pt idx="2">
+                  <c:v>Sprint5</c:v>
+                </c:pt>
+                <c:pt idx="3">
+                  <c:v>Sprint6</c:v>
+                </c:pt>
+                <c:pt idx="4">
+                  <c:v>Sprint7</c:v>
+                </c:pt>
+                <c:pt idx="5">
+                  <c:v>Sprint8</c:v>
+                </c:pt>
+                <c:pt idx="6">
+                  <c:v>Sprint9</c:v>
+                </c:pt>
+                <c:pt idx="7">
+                  <c:v>Sprint10</c:v>
+                </c:pt>
+                <c:pt idx="8">
+                  <c:v>Sprint11</c:v>
+                </c:pt>
+                <c:pt idx="9">
+                  <c:v>Sprint12</c:v>
+                </c:pt>
+              </c:strCache>
+            </c:strRef>
+          </c:cat>
+          <c:val>
+            <c:numRef>
+              <c:f>User!$M$7:$M$16</c:f>
+              <c:numCache>
+                <c:formatCode>General</c:formatCode>
+                <c:ptCount val="10"/>
+                <c:pt idx="0">
+                  <c:v>52</c:v>
+                </c:pt>
+                <c:pt idx="1">
+                  <c:v>46.8</c:v>
+                </c:pt>
+                <c:pt idx="2">
+                  <c:v>41.6</c:v>
+                </c:pt>
+                <c:pt idx="3">
+                  <c:v>36.4</c:v>
+                </c:pt>
+                <c:pt idx="4">
+                  <c:v>31.2</c:v>
+                </c:pt>
+                <c:pt idx="5">
+                  <c:v>26</c:v>
+                </c:pt>
+                <c:pt idx="6">
+                  <c:v>20.8</c:v>
+                </c:pt>
+                <c:pt idx="7">
+                  <c:v>15.6</c:v>
+                </c:pt>
+                <c:pt idx="8">
+                  <c:v>10.4</c:v>
+                </c:pt>
+                <c:pt idx="9">
+                  <c:v>5.2</c:v>
+                </c:pt>
+              </c:numCache>
+            </c:numRef>
+          </c:val>
+          <c:smooth val="0"/>
+          <c:extLst>
+            <c:ext xmlns:c16="http://schemas.microsoft.com/office/drawing/2014/chart" uri="{C3380CC4-5D6E-409C-BE32-E72D297353CC}">
+              <c16:uniqueId val="{00000001-CE72-4BD1-9B55-13319E1D717B}"/>
+            </c:ext>
+          </c:extLst>
+        </c:ser>
+        <c:dLbls>
+          <c:showLegendKey val="0"/>
+          <c:showVal val="0"/>
+          <c:showCatName val="0"/>
+          <c:showSerName val="0"/>
+          <c:showPercent val="0"/>
+          <c:showBubbleSize val="0"/>
+        </c:dLbls>
+        <c:smooth val="0"/>
+        <c:axId val="1447939760"/>
+        <c:axId val="1447939344"/>
+      </c:lineChart>
+      <c:catAx>
+        <c:axId val="1447939760"/>
+        <c:scaling>
+          <c:orientation val="minMax"/>
+        </c:scaling>
+        <c:delete val="0"/>
+        <c:axPos val="b"/>
+        <c:numFmt formatCode="General" sourceLinked="1"/>
+        <c:majorTickMark val="none"/>
+        <c:minorTickMark val="none"/>
+        <c:tickLblPos val="nextTo"/>
+        <c:spPr>
+          <a:noFill/>
+          <a:ln w="9525" cap="flat" cmpd="sng" algn="ctr">
+            <a:solidFill>
+              <a:schemeClr val="tx1">
+                <a:lumMod val="15000"/>
+                <a:lumOff val="85000"/>
+              </a:schemeClr>
+            </a:solidFill>
+            <a:round/>
+          </a:ln>
+          <a:effectLst/>
+        </c:spPr>
+        <c:txPr>
+          <a:bodyPr rot="-60000000" spcFirstLastPara="1" vertOverflow="ellipsis" vert="horz" wrap="square" anchor="ctr" anchorCtr="1"/>
+          <a:lstStyle/>
+          <a:p>
+            <a:pPr>
+              <a:defRPr sz="900" b="0" i="0" u="none" strike="noStrike" kern="1200" baseline="0">
+                <a:solidFill>
+                  <a:schemeClr val="tx1">
+                    <a:lumMod val="65000"/>
+                    <a:lumOff val="35000"/>
+                  </a:schemeClr>
+                </a:solidFill>
+                <a:latin typeface="+mn-lt"/>
+                <a:ea typeface="+mn-ea"/>
+                <a:cs typeface="+mn-cs"/>
+              </a:defRPr>
+            </a:pPr>
+            <a:endParaRPr lang="en-US"/>
+          </a:p>
+        </c:txPr>
+        <c:crossAx val="1447939344"/>
+        <c:crosses val="autoZero"/>
+        <c:auto val="1"/>
+        <c:lblAlgn val="ctr"/>
+        <c:lblOffset val="100"/>
+        <c:noMultiLvlLbl val="0"/>
+      </c:catAx>
+      <c:valAx>
+        <c:axId val="1447939344"/>
+        <c:scaling>
+          <c:orientation val="minMax"/>
+        </c:scaling>
+        <c:delete val="0"/>
+        <c:axPos val="l"/>
+        <c:majorGridlines>
+          <c:spPr>
+            <a:ln w="9525" cap="flat" cmpd="sng" algn="ctr">
+              <a:solidFill>
+                <a:schemeClr val="tx1">
+                  <a:lumMod val="15000"/>
+                  <a:lumOff val="85000"/>
+                </a:schemeClr>
+              </a:solidFill>
+              <a:round/>
+            </a:ln>
+            <a:effectLst/>
+          </c:spPr>
+        </c:majorGridlines>
+        <c:numFmt formatCode="General" sourceLinked="1"/>
+        <c:majorTickMark val="none"/>
+        <c:minorTickMark val="none"/>
+        <c:tickLblPos val="nextTo"/>
+        <c:spPr>
+          <a:noFill/>
+          <a:ln>
+            <a:noFill/>
+          </a:ln>
+          <a:effectLst/>
+        </c:spPr>
+        <c:txPr>
+          <a:bodyPr rot="-60000000" spcFirstLastPara="1" vertOverflow="ellipsis" vert="horz" wrap="square" anchor="ctr" anchorCtr="1"/>
+          <a:lstStyle/>
+          <a:p>
+            <a:pPr>
+              <a:defRPr sz="900" b="0" i="0" u="none" strike="noStrike" kern="1200" baseline="0">
+                <a:solidFill>
+                  <a:schemeClr val="tx1">
+                    <a:lumMod val="65000"/>
+                    <a:lumOff val="35000"/>
+                  </a:schemeClr>
+                </a:solidFill>
+                <a:latin typeface="+mn-lt"/>
+                <a:ea typeface="+mn-ea"/>
+                <a:cs typeface="+mn-cs"/>
+              </a:defRPr>
+            </a:pPr>
+            <a:endParaRPr lang="en-US"/>
+          </a:p>
+        </c:txPr>
+        <c:crossAx val="1447939760"/>
+        <c:crosses val="autoZero"/>
+        <c:crossBetween val="between"/>
+      </c:valAx>
+      <c:spPr>
+        <a:noFill/>
+        <a:ln>
+          <a:noFill/>
+        </a:ln>
+        <a:effectLst/>
+      </c:spPr>
+    </c:plotArea>
+    <c:legend>
+      <c:legendPos val="b"/>
+      <c:layout/>
+      <c:overlay val="0"/>
+      <c:spPr>
+        <a:noFill/>
+        <a:ln>
+          <a:noFill/>
+        </a:ln>
+        <a:effectLst/>
+      </c:spPr>
+      <c:txPr>
+        <a:bodyPr rot="0" spcFirstLastPara="1" vertOverflow="ellipsis" vert="horz" wrap="square" anchor="ctr" anchorCtr="1"/>
+        <a:lstStyle/>
+        <a:p>
+          <a:pPr>
+            <a:defRPr sz="900" b="0" i="0" u="none" strike="noStrike" kern="1200" baseline="0">
+              <a:solidFill>
+                <a:schemeClr val="tx1">
+                  <a:lumMod val="65000"/>
+                  <a:lumOff val="35000"/>
+                </a:schemeClr>
+              </a:solidFill>
+              <a:latin typeface="+mn-lt"/>
+              <a:ea typeface="+mn-ea"/>
+              <a:cs typeface="+mn-cs"/>
+            </a:defRPr>
+          </a:pPr>
+          <a:endParaRPr lang="en-US"/>
+        </a:p>
+      </c:txPr>
+    </c:legend>
+    <c:plotVisOnly val="1"/>
+    <c:dispBlanksAs val="gap"/>
+    <c:showDLblsOverMax val="0"/>
+  </c:chart>
+  <c:spPr>
+    <a:noFill/>
+    <a:ln>
+      <a:noFill/>
+    </a:ln>
+    <a:effectLst/>
+  </c:spPr>
+  <c:txPr>
+    <a:bodyPr/>
+    <a:lstStyle/>
+    <a:p>
+      <a:pPr>
+        <a:defRPr/>
+      </a:pPr>
+      <a:endParaRPr lang="en-US"/>
+    </a:p>
+  </c:txPr>
+  <c:externalData r:id="rId3">
+    <c:autoUpdate val="0"/>
+  </c:externalData>
+</c:chartSpace>
+</file>
+
+<file path=ppt/charts/colors1.xml><?xml version="1.0" encoding="utf-8"?>
+<cs:colorStyle xmlns:cs="http://schemas.microsoft.com/office/drawing/2012/chartStyle" xmlns:a="http://schemas.openxmlformats.org/drawingml/2006/main" meth="cycle" id="10">
+  <a:schemeClr val="accent1"/>
+  <a:schemeClr val="accent2"/>
+  <a:schemeClr val="accent3"/>
+  <a:schemeClr val="accent4"/>
+  <a:schemeClr val="accent5"/>
+  <a:schemeClr val="accent6"/>
+  <cs:variation/>
+  <cs:variation>
+    <a:lumMod val="60000"/>
+  </cs:variation>
+  <cs:variation>
+    <a:lumMod val="80000"/>
+    <a:lumOff val="20000"/>
+  </cs:variation>
+  <cs:variation>
+    <a:lumMod val="80000"/>
+  </cs:variation>
+  <cs:variation>
+    <a:lumMod val="60000"/>
+    <a:lumOff val="40000"/>
+  </cs:variation>
+  <cs:variation>
+    <a:lumMod val="50000"/>
+  </cs:variation>
+  <cs:variation>
+    <a:lumMod val="70000"/>
+    <a:lumOff val="30000"/>
+  </cs:variation>
+  <cs:variation>
+    <a:lumMod val="70000"/>
+  </cs:variation>
+  <cs:variation>
+    <a:lumMod val="50000"/>
+    <a:lumOff val="50000"/>
+  </cs:variation>
+</cs:colorStyle>
+</file>
+
+<file path=ppt/charts/style1.xml><?xml version="1.0" encoding="utf-8"?>
+<cs:chartStyle xmlns:cs="http://schemas.microsoft.com/office/drawing/2012/chartStyle" xmlns:a="http://schemas.openxmlformats.org/drawingml/2006/main" id="227">
+  <cs:axisTitle>
+    <cs:lnRef idx="0"/>
+    <cs:fillRef idx="0"/>
+    <cs:effectRef idx="0"/>
+    <cs:fontRef idx="minor">
+      <a:schemeClr val="tx1">
+        <a:lumMod val="65000"/>
+        <a:lumOff val="35000"/>
+      </a:schemeClr>
+    </cs:fontRef>
+    <cs:defRPr sz="1000" kern="1200"/>
+  </cs:axisTitle>
+  <cs:categoryAxis>
+    <cs:lnRef idx="0"/>
+    <cs:fillRef idx="0"/>
+    <cs:effectRef idx="0"/>
+    <cs:fontRef idx="minor">
+      <a:schemeClr val="tx1">
+        <a:lumMod val="65000"/>
+        <a:lumOff val="35000"/>
+      </a:schemeClr>
+    </cs:fontRef>
+    <cs:spPr>
+      <a:ln w="9525" cap="flat" cmpd="sng" algn="ctr">
+        <a:solidFill>
+          <a:schemeClr val="tx1">
+            <a:lumMod val="15000"/>
+            <a:lumOff val="85000"/>
+          </a:schemeClr>
+        </a:solidFill>
+        <a:round/>
+      </a:ln>
+    </cs:spPr>
+    <cs:defRPr sz="900" kern="1200"/>
+  </cs:categoryAxis>
+  <cs:chartArea mods="allowNoFillOverride allowNoLineOverride">
+    <cs:lnRef idx="0"/>
+    <cs:fillRef idx="0"/>
+    <cs:effectRef idx="0"/>
+    <cs:fontRef idx="minor">
+      <a:schemeClr val="tx1"/>
+    </cs:fontRef>
+    <cs:spPr>
+      <a:solidFill>
+        <a:schemeClr val="bg1"/>
+      </a:solidFill>
+      <a:ln w="9525" cap="flat" cmpd="sng" algn="ctr">
+        <a:solidFill>
+          <a:schemeClr val="tx1">
+            <a:lumMod val="15000"/>
+            <a:lumOff val="85000"/>
+          </a:schemeClr>
+        </a:solidFill>
+        <a:round/>
+      </a:ln>
+    </cs:spPr>
+    <cs:defRPr sz="1000" kern="1200"/>
+  </cs:chartArea>
+  <cs:dataLabel>
+    <cs:lnRef idx="0"/>
+    <cs:fillRef idx="0"/>
+    <cs:effectRef idx="0"/>
+    <cs:fontRef idx="minor">
+      <a:schemeClr val="tx1">
+        <a:lumMod val="75000"/>
+        <a:lumOff val="25000"/>
+      </a:schemeClr>
+    </cs:fontRef>
+    <cs:defRPr sz="900" kern="1200"/>
+  </cs:dataLabel>
+  <cs:dataLabelCallout>
+    <cs:lnRef idx="0"/>
+    <cs:fillRef idx="0"/>
+    <cs:effectRef idx="0"/>
+    <cs:fontRef idx="minor">
+      <a:schemeClr val="dk1">
+        <a:lumMod val="65000"/>
+        <a:lumOff val="35000"/>
+      </a:schemeClr>
+    </cs:fontRef>
+    <cs:spPr>
+      <a:solidFill>
+        <a:schemeClr val="lt1"/>
+      </a:solidFill>
+      <a:ln>
+        <a:solidFill>
+          <a:schemeClr val="dk1">
+            <a:lumMod val="25000"/>
+            <a:lumOff val="75000"/>
+          </a:schemeClr>
+        </a:solidFill>
+      </a:ln>
+    </cs:spPr>
+    <cs:defRPr sz="900" kern="1200"/>
+    <cs:bodyPr rot="0" spcFirstLastPara="1" vertOverflow="clip" horzOverflow="clip" vert="horz" wrap="square" lIns="36576" tIns="18288" rIns="36576" bIns="18288" anchor="ctr" anchorCtr="1">
+      <a:spAutoFit/>
+    </cs:bodyPr>
+  </cs:dataLabelCallout>
+  <cs:dataPoint>
+    <cs:lnRef idx="0"/>
+    <cs:fillRef idx="1">
+      <cs:styleClr val="auto"/>
+    </cs:fillRef>
+    <cs:effectRef idx="0"/>
+    <cs:fontRef idx="minor">
+      <a:schemeClr val="tx1"/>
+    </cs:fontRef>
+    <cs:spPr>
+      <a:solidFill>
+        <a:schemeClr val="phClr"/>
+      </a:solidFill>
+    </cs:spPr>
+  </cs:dataPoint>
+  <cs:dataPoint3D>
+    <cs:lnRef idx="0"/>
+    <cs:fillRef idx="1">
+      <cs:styleClr val="auto"/>
+    </cs:fillRef>
+    <cs:effectRef idx="0"/>
+    <cs:fontRef idx="minor">
+      <a:schemeClr val="tx1"/>
+    </cs:fontRef>
+    <cs:spPr>
+      <a:solidFill>
+        <a:schemeClr val="phClr"/>
+      </a:solidFill>
+    </cs:spPr>
+  </cs:dataPoint3D>
+  <cs:dataPointLine>
+    <cs:lnRef idx="0">
+      <cs:styleClr val="auto"/>
+    </cs:lnRef>
+    <cs:fillRef idx="1"/>
+    <cs:effectRef idx="0"/>
+    <cs:fontRef idx="minor">
+      <a:schemeClr val="tx1"/>
+    </cs:fontRef>
+    <cs:spPr>
+      <a:ln w="28575" cap="rnd">
+        <a:solidFill>
+          <a:schemeClr val="phClr"/>
+        </a:solidFill>
+        <a:round/>
+      </a:ln>
+    </cs:spPr>
+  </cs:dataPointLine>
+  <cs:dataPointMarker>
+    <cs:lnRef idx="0">
+      <cs:styleClr val="auto"/>
+    </cs:lnRef>
+    <cs:fillRef idx="1">
+      <cs:styleClr val="auto"/>
+    </cs:fillRef>
+    <cs:effectRef idx="0"/>
+    <cs:fontRef idx="minor">
+      <a:schemeClr val="tx1"/>
+    </cs:fontRef>
+    <cs:spPr>
+      <a:solidFill>
+        <a:schemeClr val="phClr"/>
+      </a:solidFill>
+      <a:ln w="9525">
+        <a:solidFill>
+          <a:schemeClr val="phClr"/>
+        </a:solidFill>
+      </a:ln>
+    </cs:spPr>
+  </cs:dataPointMarker>
+  <cs:dataPointMarkerLayout symbol="circle" size="5"/>
+  <cs:dataPointWireframe>
+    <cs:lnRef idx="0">
+      <cs:styleClr val="auto"/>
+    </cs:lnRef>
+    <cs:fillRef idx="1"/>
+    <cs:effectRef idx="0"/>
+    <cs:fontRef idx="minor">
+      <a:schemeClr val="tx1"/>
+    </cs:fontRef>
+    <cs:spPr>
+      <a:ln w="9525" cap="rnd">
+        <a:solidFill>
+          <a:schemeClr val="phClr"/>
+        </a:solidFill>
+        <a:round/>
+      </a:ln>
+    </cs:spPr>
+  </cs:dataPointWireframe>
+  <cs:dataTable>
+    <cs:lnRef idx="0"/>
+    <cs:fillRef idx="0"/>
+    <cs:effectRef idx="0"/>
+    <cs:fontRef idx="minor">
+      <a:schemeClr val="tx1">
+        <a:lumMod val="65000"/>
+        <a:lumOff val="35000"/>
+      </a:schemeClr>
+    </cs:fontRef>
+    <cs:spPr>
+      <a:noFill/>
+      <a:ln w="9525" cap="flat" cmpd="sng" algn="ctr">
+        <a:solidFill>
+          <a:schemeClr val="tx1">
+            <a:lumMod val="15000"/>
+            <a:lumOff val="85000"/>
+          </a:schemeClr>
+        </a:solidFill>
+        <a:round/>
+      </a:ln>
+    </cs:spPr>
+    <cs:defRPr sz="900" kern="1200"/>
+  </cs:dataTable>
+  <cs:downBar>
+    <cs:lnRef idx="0"/>
+    <cs:fillRef idx="0"/>
+    <cs:effectRef idx="0"/>
+    <cs:fontRef idx="minor">
+      <a:schemeClr val="dk1"/>
+    </cs:fontRef>
+    <cs:spPr>
+      <a:solidFill>
+        <a:schemeClr val="dk1">
+          <a:lumMod val="65000"/>
+          <a:lumOff val="35000"/>
+        </a:schemeClr>
+      </a:solidFill>
+      <a:ln w="9525">
+        <a:solidFill>
+          <a:schemeClr val="tx1">
+            <a:lumMod val="65000"/>
+            <a:lumOff val="35000"/>
+          </a:schemeClr>
+        </a:solidFill>
+      </a:ln>
+    </cs:spPr>
+  </cs:downBar>
+  <cs:dropLine>
+    <cs:lnRef idx="0"/>
+    <cs:fillRef idx="0"/>
+    <cs:effectRef idx="0"/>
+    <cs:fontRef idx="minor">
+      <a:schemeClr val="tx1"/>
+    </cs:fontRef>
+    <cs:spPr>
+      <a:ln w="9525" cap="flat" cmpd="sng" algn="ctr">
+        <a:solidFill>
+          <a:schemeClr val="tx1">
+            <a:lumMod val="35000"/>
+            <a:lumOff val="65000"/>
+          </a:schemeClr>
+        </a:solidFill>
+        <a:round/>
+      </a:ln>
+    </cs:spPr>
+  </cs:dropLine>
+  <cs:errorBar>
+    <cs:lnRef idx="0"/>
+    <cs:fillRef idx="0"/>
+    <cs:effectRef idx="0"/>
+    <cs:fontRef idx="minor">
+      <a:schemeClr val="tx1"/>
+    </cs:fontRef>
+    <cs:spPr>
+      <a:ln w="9525" cap="flat" cmpd="sng" algn="ctr">
+        <a:solidFill>
+          <a:schemeClr val="tx1">
+            <a:lumMod val="65000"/>
+            <a:lumOff val="35000"/>
+          </a:schemeClr>
+        </a:solidFill>
+        <a:round/>
+      </a:ln>
+    </cs:spPr>
+  </cs:errorBar>
+  <cs:floor>
+    <cs:lnRef idx="0"/>
+    <cs:fillRef idx="0"/>
+    <cs:effectRef idx="0"/>
+    <cs:fontRef idx="minor">
+      <a:schemeClr val="tx1"/>
+    </cs:fontRef>
+    <cs:spPr>
+      <a:noFill/>
+      <a:ln>
+        <a:noFill/>
+      </a:ln>
+    </cs:spPr>
+  </cs:floor>
+  <cs:gridlineMajor>
+    <cs:lnRef idx="0"/>
+    <cs:fillRef idx="0"/>
+    <cs:effectRef idx="0"/>
+    <cs:fontRef idx="minor">
+      <a:schemeClr val="tx1"/>
+    </cs:fontRef>
+    <cs:spPr>
+      <a:ln w="9525" cap="flat" cmpd="sng" algn="ctr">
+        <a:solidFill>
+          <a:schemeClr val="tx1">
+            <a:lumMod val="15000"/>
+            <a:lumOff val="85000"/>
+          </a:schemeClr>
+        </a:solidFill>
+        <a:round/>
+      </a:ln>
+    </cs:spPr>
+  </cs:gridlineMajor>
+  <cs:gridlineMinor>
+    <cs:lnRef idx="0"/>
+    <cs:fillRef idx="0"/>
+    <cs:effectRef idx="0"/>
+    <cs:fontRef idx="minor">
+      <a:schemeClr val="tx1"/>
+    </cs:fontRef>
+    <cs:spPr>
+      <a:ln w="9525" cap="flat" cmpd="sng" algn="ctr">
+        <a:solidFill>
+          <a:schemeClr val="tx1">
+            <a:lumMod val="5000"/>
+            <a:lumOff val="95000"/>
+          </a:schemeClr>
+        </a:solidFill>
+        <a:round/>
+      </a:ln>
+    </cs:spPr>
+  </cs:gridlineMinor>
+  <cs:hiLoLine>
+    <cs:lnRef idx="0"/>
+    <cs:fillRef idx="0"/>
+    <cs:effectRef idx="0"/>
+    <cs:fontRef idx="minor">
+      <a:schemeClr val="tx1"/>
+    </cs:fontRef>
+    <cs:spPr>
+      <a:ln w="9525" cap="flat" cmpd="sng" algn="ctr">
+        <a:solidFill>
+          <a:schemeClr val="tx1">
+            <a:lumMod val="75000"/>
+            <a:lumOff val="25000"/>
+          </a:schemeClr>
+        </a:solidFill>
+        <a:round/>
+      </a:ln>
+    </cs:spPr>
+  </cs:hiLoLine>
+  <cs:leaderLine>
+    <cs:lnRef idx="0"/>
+    <cs:fillRef idx="0"/>
+    <cs:effectRef idx="0"/>
+    <cs:fontRef idx="minor">
+      <a:schemeClr val="tx1"/>
+    </cs:fontRef>
+    <cs:spPr>
+      <a:ln w="9525" cap="flat" cmpd="sng" algn="ctr">
+        <a:solidFill>
+          <a:schemeClr val="tx1">
+            <a:lumMod val="35000"/>
+            <a:lumOff val="65000"/>
+          </a:schemeClr>
+        </a:solidFill>
+        <a:round/>
+      </a:ln>
+    </cs:spPr>
+  </cs:leaderLine>
+  <cs:legend>
+    <cs:lnRef idx="0"/>
+    <cs:fillRef idx="0"/>
+    <cs:effectRef idx="0"/>
+    <cs:fontRef idx="minor">
+      <a:schemeClr val="tx1">
+        <a:lumMod val="65000"/>
+        <a:lumOff val="35000"/>
+      </a:schemeClr>
+    </cs:fontRef>
+    <cs:defRPr sz="900" kern="1200"/>
+  </cs:legend>
+  <cs:plotArea mods="allowNoFillOverride allowNoLineOverride">
+    <cs:lnRef idx="0"/>
+    <cs:fillRef idx="0"/>
+    <cs:effectRef idx="0"/>
+    <cs:fontRef idx="minor">
+      <a:schemeClr val="tx1"/>
+    </cs:fontRef>
+  </cs:plotArea>
+  <cs:plotArea3D mods="allowNoFillOverride allowNoLineOverride">
+    <cs:lnRef idx="0"/>
+    <cs:fillRef idx="0"/>
+    <cs:effectRef idx="0"/>
+    <cs:fontRef idx="minor">
+      <a:schemeClr val="tx1"/>
+    </cs:fontRef>
+  </cs:plotArea3D>
+  <cs:seriesAxis>
+    <cs:lnRef idx="0"/>
+    <cs:fillRef idx="0"/>
+    <cs:effectRef idx="0"/>
+    <cs:fontRef idx="minor">
+      <a:schemeClr val="tx1">
+        <a:lumMod val="65000"/>
+        <a:lumOff val="35000"/>
+      </a:schemeClr>
+    </cs:fontRef>
+    <cs:defRPr sz="900" kern="1200"/>
+  </cs:seriesAxis>
+  <cs:seriesLine>
+    <cs:lnRef idx="0"/>
+    <cs:fillRef idx="0"/>
+    <cs:effectRef idx="0"/>
+    <cs:fontRef idx="minor">
+      <a:schemeClr val="tx1"/>
+    </cs:fontRef>
+    <cs:spPr>
+      <a:ln w="9525" cap="flat" cmpd="sng" algn="ctr">
+        <a:solidFill>
+          <a:schemeClr val="tx1">
+            <a:lumMod val="35000"/>
+            <a:lumOff val="65000"/>
+          </a:schemeClr>
+        </a:solidFill>
+        <a:round/>
+      </a:ln>
+    </cs:spPr>
+  </cs:seriesLine>
+  <cs:title>
+    <cs:lnRef idx="0"/>
+    <cs:fillRef idx="0"/>
+    <cs:effectRef idx="0"/>
+    <cs:fontRef idx="minor">
+      <a:schemeClr val="tx1">
+        <a:lumMod val="65000"/>
+        <a:lumOff val="35000"/>
+      </a:schemeClr>
+    </cs:fontRef>
+    <cs:defRPr sz="1400" b="0" kern="1200" spc="0" baseline="0"/>
+  </cs:title>
+  <cs:trendline>
+    <cs:lnRef idx="0">
+      <cs:styleClr val="auto"/>
+    </cs:lnRef>
+    <cs:fillRef idx="0"/>
+    <cs:effectRef idx="0"/>
+    <cs:fontRef idx="minor">
+      <a:schemeClr val="tx1"/>
+    </cs:fontRef>
+    <cs:spPr>
+      <a:ln w="19050" cap="rnd">
+        <a:solidFill>
+          <a:schemeClr val="phClr"/>
+        </a:solidFill>
+        <a:prstDash val="sysDot"/>
+      </a:ln>
+    </cs:spPr>
+  </cs:trendline>
+  <cs:trendlineLabel>
+    <cs:lnRef idx="0"/>
+    <cs:fillRef idx="0"/>
+    <cs:effectRef idx="0"/>
+    <cs:fontRef idx="minor">
+      <a:schemeClr val="tx1">
+        <a:lumMod val="65000"/>
+        <a:lumOff val="35000"/>
+      </a:schemeClr>
+    </cs:fontRef>
+    <cs:defRPr sz="900" kern="1200"/>
+  </cs:trendlineLabel>
+  <cs:upBar>
+    <cs:lnRef idx="0"/>
+    <cs:fillRef idx="0"/>
+    <cs:effectRef idx="0"/>
+    <cs:fontRef idx="minor">
+      <a:schemeClr val="dk1"/>
+    </cs:fontRef>
+    <cs:spPr>
+      <a:solidFill>
+        <a:schemeClr val="lt1"/>
+      </a:solidFill>
+      <a:ln w="9525">
+        <a:solidFill>
+          <a:schemeClr val="tx1">
+            <a:lumMod val="15000"/>
+            <a:lumOff val="85000"/>
+          </a:schemeClr>
+        </a:solidFill>
+      </a:ln>
+    </cs:spPr>
+  </cs:upBar>
+  <cs:valueAxis>
+    <cs:lnRef idx="0"/>
+    <cs:fillRef idx="0"/>
+    <cs:effectRef idx="0"/>
+    <cs:fontRef idx="minor">
+      <a:schemeClr val="tx1">
+        <a:lumMod val="65000"/>
+        <a:lumOff val="35000"/>
+      </a:schemeClr>
+    </cs:fontRef>
+    <cs:defRPr sz="900" kern="1200"/>
+  </cs:valueAxis>
+  <cs:wall>
+    <cs:lnRef idx="0"/>
+    <cs:fillRef idx="0"/>
+    <cs:effectRef idx="0"/>
+    <cs:fontRef idx="minor">
+      <a:schemeClr val="tx1"/>
+    </cs:fontRef>
+    <cs:spPr>
+      <a:noFill/>
+      <a:ln>
+        <a:noFill/>
+      </a:ln>
+    </cs:spPr>
+  </cs:wall>
+</cs:chartStyle>
+</file>
+
 <file path=ppt/slideLayouts/slideLayout1.xml><?xml version="1.0" encoding="utf-8"?>
 <p:sldLayout xmlns:a="http://schemas.openxmlformats.org/drawingml/2006/main" xmlns:r="http://schemas.openxmlformats.org/officeDocument/2006/relationships" xmlns:p="http://schemas.openxmlformats.org/presentationml/2006/main" type="title" preserve="1">
   <p:cSld name="Title Slide">
@@ -259,7 +1258,7 @@
           <a:p>
             <a:fld id="{9184DA70-C731-4C70-880D-CCD4705E623C}" type="datetime1">
               <a:rPr lang="en-US" smtClean="0"/>
-              <a:t>11/30/2019</a:t>
+              <a:t>12/12/2019</a:t>
             </a:fld>
             <a:endParaRPr lang="en-US" dirty="0"/>
           </a:p>
@@ -429,7 +1428,7 @@
           <a:p>
             <a:fld id="{B612A279-0833-481D-8C56-F67FD0AC6C50}" type="datetime1">
               <a:rPr lang="en-US" smtClean="0"/>
-              <a:t>11/30/2019</a:t>
+              <a:t>12/12/2019</a:t>
             </a:fld>
             <a:endParaRPr lang="en-US" dirty="0"/>
           </a:p>
@@ -609,7 +1608,7 @@
           <a:p>
             <a:fld id="{6587DA83-5663-4C9C-B9AA-0B40A3DAFF81}" type="datetime1">
               <a:rPr lang="en-US" smtClean="0"/>
-              <a:t>11/30/2019</a:t>
+              <a:t>12/12/2019</a:t>
             </a:fld>
             <a:endParaRPr lang="en-US" dirty="0"/>
           </a:p>
@@ -779,7 +1778,7 @@
           <a:p>
             <a:fld id="{4BE1D723-8F53-4F53-90B0-1982A396982E}" type="datetime1">
               <a:rPr lang="en-US" smtClean="0"/>
-              <a:t>11/30/2019</a:t>
+              <a:t>12/12/2019</a:t>
             </a:fld>
             <a:endParaRPr lang="en-US" dirty="0"/>
           </a:p>
@@ -1025,7 +2024,7 @@
           <a:p>
             <a:fld id="{97669AF7-7BEB-44E4-9852-375E34362B5B}" type="datetime1">
               <a:rPr lang="en-US" smtClean="0"/>
-              <a:t>11/30/2019</a:t>
+              <a:t>12/12/2019</a:t>
             </a:fld>
             <a:endParaRPr lang="en-US" dirty="0"/>
           </a:p>
@@ -1257,7 +2256,7 @@
           <a:p>
             <a:fld id="{BAAAC38D-0552-4C82-B593-E6124DFADBE2}" type="datetime1">
               <a:rPr lang="en-US" smtClean="0"/>
-              <a:t>11/30/2019</a:t>
+              <a:t>12/12/2019</a:t>
             </a:fld>
             <a:endParaRPr lang="en-US" dirty="0"/>
           </a:p>
@@ -1624,7 +2623,7 @@
           <a:p>
             <a:fld id="{D9DF0F1C-5577-4ACB-BB62-DF8F3C494C7E}" type="datetime1">
               <a:rPr lang="en-US" smtClean="0"/>
-              <a:t>11/30/2019</a:t>
+              <a:t>12/12/2019</a:t>
             </a:fld>
             <a:endParaRPr lang="en-US" dirty="0"/>
           </a:p>
@@ -1742,7 +2741,7 @@
           <a:p>
             <a:fld id="{1775B394-D9F9-4F0C-B15D-605F45CB9E9F}" type="datetime1">
               <a:rPr lang="en-US" smtClean="0"/>
-              <a:t>11/30/2019</a:t>
+              <a:t>12/12/2019</a:t>
             </a:fld>
             <a:endParaRPr lang="en-US" dirty="0"/>
           </a:p>
@@ -1837,7 +2836,7 @@
           <a:p>
             <a:fld id="{39667345-2558-425A-8533-9BFDBCE15005}" type="datetime1">
               <a:rPr lang="en-US" smtClean="0"/>
-              <a:t>11/30/2019</a:t>
+              <a:t>12/12/2019</a:t>
             </a:fld>
             <a:endParaRPr lang="en-US" dirty="0"/>
           </a:p>
@@ -2114,7 +3113,7 @@
           <a:p>
             <a:fld id="{92BEA474-078D-4E9B-9B14-09A87B19DC46}" type="datetime1">
               <a:rPr lang="en-US" smtClean="0"/>
-              <a:t>11/30/2019</a:t>
+              <a:t>12/12/2019</a:t>
             </a:fld>
             <a:endParaRPr lang="en-US" dirty="0"/>
           </a:p>
@@ -2368,7 +3367,7 @@
           <a:p>
             <a:fld id="{4907D986-8816-4272-A432-0437A28A9828}" type="datetime1">
               <a:rPr lang="en-US" smtClean="0"/>
-              <a:t>11/30/2019</a:t>
+              <a:t>12/12/2019</a:t>
             </a:fld>
             <a:endParaRPr lang="en-US" dirty="0"/>
           </a:p>
@@ -2582,7 +3581,7 @@
           <a:p>
             <a:fld id="{62D6E202-B606-4609-B914-27C9371A1F6D}" type="datetime1">
               <a:rPr lang="en-US" smtClean="0"/>
-              <a:t>11/30/2019</a:t>
+              <a:t>12/12/2019</a:t>
             </a:fld>
             <a:endParaRPr lang="en-US" dirty="0"/>
           </a:p>
@@ -3474,7 +4473,14 @@
                 <a:latin typeface="Times New Roman" panose="02020603050405020304" pitchFamily="18" charset="0"/>
                 <a:cs typeface="Times New Roman" panose="02020603050405020304" pitchFamily="18" charset="0"/>
               </a:rPr>
-              <a:t>dụng phần mềm, và mã nguồn).</a:t>
+              <a:t>dụng phần mềm, và mã nguồn</a:t>
+            </a:r>
+            <a:r>
+              <a:rPr lang="vi-VN" sz="3200" dirty="0" smtClean="0">
+                <a:latin typeface="Times New Roman" panose="02020603050405020304" pitchFamily="18" charset="0"/>
+                <a:cs typeface="Times New Roman" panose="02020603050405020304" pitchFamily="18" charset="0"/>
+              </a:rPr>
+              <a:t>).</a:t>
             </a:r>
             <a:endParaRPr lang="en-US" sz="3200" dirty="0">
               <a:latin typeface="Times New Roman" panose="02020603050405020304" pitchFamily="18" charset="0"/>
@@ -3485,7 +4491,7 @@
       </p:sp>
       <p:pic>
         <p:nvPicPr>
-          <p:cNvPr id="4" name="Picture 3"/>
+          <p:cNvPr id="6" name="Picture 5"/>
           <p:cNvPicPr>
             <a:picLocks noChangeAspect="1"/>
           </p:cNvPicPr>
@@ -3505,37 +4511,7 @@
         </p:blipFill>
         <p:spPr>
           <a:xfrm>
-            <a:off x="6327818" y="2377731"/>
-            <a:ext cx="5768388" cy="3500551"/>
-          </a:xfrm>
-          <a:prstGeom prst="rect">
-            <a:avLst/>
-          </a:prstGeom>
-        </p:spPr>
-      </p:pic>
-      <p:pic>
-        <p:nvPicPr>
-          <p:cNvPr id="6" name="Picture 5"/>
-          <p:cNvPicPr>
-            <a:picLocks noChangeAspect="1"/>
-          </p:cNvPicPr>
-          <p:nvPr/>
-        </p:nvPicPr>
-        <p:blipFill>
-          <a:blip r:embed="rId3">
-            <a:extLst>
-              <a:ext uri="{28A0092B-C50C-407E-A947-70E740481C1C}">
-                <a14:useLocalDpi xmlns:a14="http://schemas.microsoft.com/office/drawing/2010/main" val="0"/>
-              </a:ext>
-            </a:extLst>
-          </a:blip>
-          <a:stretch>
-            <a:fillRect/>
-          </a:stretch>
-        </p:blipFill>
-        <p:spPr>
-          <a:xfrm>
-            <a:off x="156754" y="2377732"/>
+            <a:off x="5225142" y="2273229"/>
             <a:ext cx="6011907" cy="3500551"/>
           </a:xfrm>
           <a:prstGeom prst="rect">
@@ -3543,10 +4519,44 @@
           </a:prstGeom>
         </p:spPr>
       </p:pic>
+      <p:sp>
+        <p:nvSpPr>
+          <p:cNvPr id="7" name="Content Placeholder 2"/>
+          <p:cNvSpPr>
+            <a:spLocks noGrp="1"/>
+          </p:cNvSpPr>
+          <p:nvPr>
+            <p:ph idx="1"/>
+          </p:nvPr>
+        </p:nvSpPr>
+        <p:spPr>
+          <a:xfrm>
+            <a:off x="838199" y="1825625"/>
+            <a:ext cx="3995057" cy="4351338"/>
+          </a:xfrm>
+        </p:spPr>
+        <p:txBody>
+          <a:bodyPr/>
+          <a:lstStyle/>
+          <a:p>
+            <a:r>
+              <a:rPr lang="en-US" dirty="0" smtClean="0">
+                <a:latin typeface="Times New Roman" panose="02020603050405020304" pitchFamily="18" charset="0"/>
+                <a:cs typeface="Times New Roman" panose="02020603050405020304" pitchFamily="18" charset="0"/>
+              </a:rPr>
+              <a:t>Chức năng đăng nhập</a:t>
+            </a:r>
+            <a:endParaRPr lang="en-US" dirty="0">
+              <a:latin typeface="Times New Roman" panose="02020603050405020304" pitchFamily="18" charset="0"/>
+              <a:cs typeface="Times New Roman" panose="02020603050405020304" pitchFamily="18" charset="0"/>
+            </a:endParaRPr>
+          </a:p>
+        </p:txBody>
+      </p:sp>
     </p:spTree>
     <p:extLst>
       <p:ext uri="{BB962C8B-B14F-4D97-AF65-F5344CB8AC3E}">
-        <p14:creationId xmlns:p14="http://schemas.microsoft.com/office/powerpoint/2010/main" val="2786413114"/>
+        <p14:creationId xmlns:p14="http://schemas.microsoft.com/office/powerpoint/2010/main" val="3497069547"/>
       </p:ext>
     </p:extLst>
   </p:cSld>
@@ -3583,6 +4593,373 @@
             <p:ph type="title"/>
           </p:nvPr>
         </p:nvSpPr>
+        <p:spPr>
+          <a:xfrm>
+            <a:off x="705394" y="295456"/>
+            <a:ext cx="10763794" cy="1325563"/>
+          </a:xfrm>
+        </p:spPr>
+        <p:txBody>
+          <a:bodyPr>
+            <a:noAutofit/>
+          </a:bodyPr>
+          <a:lstStyle/>
+          <a:p>
+            <a:r>
+              <a:rPr lang="en-US" sz="3200" dirty="0">
+                <a:latin typeface="Times New Roman" panose="02020603050405020304" pitchFamily="18" charset="0"/>
+                <a:cs typeface="Times New Roman" panose="02020603050405020304" pitchFamily="18" charset="0"/>
+              </a:rPr>
+              <a:t>2.</a:t>
+            </a:r>
+            <a:r>
+              <a:rPr lang="vi-VN" sz="3200" dirty="0">
+                <a:cs typeface="Times New Roman" panose="02020603050405020304" pitchFamily="18" charset="0"/>
+              </a:rPr>
+              <a:t> Trình bày bản phân phối phần mềm đầu tiên đến khách hàng của</a:t>
+            </a:r>
+            <a:r>
+              <a:rPr lang="en-US" sz="3200" dirty="0">
+                <a:latin typeface="Times New Roman" panose="02020603050405020304" pitchFamily="18" charset="0"/>
+                <a:cs typeface="Times New Roman" panose="02020603050405020304" pitchFamily="18" charset="0"/>
+              </a:rPr>
+              <a:t> </a:t>
+            </a:r>
+            <a:r>
+              <a:rPr lang="vi-VN" sz="3200" dirty="0">
+                <a:cs typeface="Times New Roman" panose="02020603050405020304" pitchFamily="18" charset="0"/>
+              </a:rPr>
+              <a:t>nhóm (Demo khách hàng trực tiếp sử dụng phần mềm, Hướng dẫn sử</a:t>
+            </a:r>
+            <a:r>
+              <a:rPr lang="en-US" sz="3200" dirty="0">
+                <a:latin typeface="Times New Roman" panose="02020603050405020304" pitchFamily="18" charset="0"/>
+                <a:cs typeface="Times New Roman" panose="02020603050405020304" pitchFamily="18" charset="0"/>
+              </a:rPr>
+              <a:t> </a:t>
+            </a:r>
+            <a:r>
+              <a:rPr lang="vi-VN" sz="3200" dirty="0">
+                <a:cs typeface="Times New Roman" panose="02020603050405020304" pitchFamily="18" charset="0"/>
+              </a:rPr>
+              <a:t>dụng phần mềm, và mã nguồn).</a:t>
+            </a:r>
+            <a:endParaRPr lang="en-US" sz="3200" dirty="0"/>
+          </a:p>
+        </p:txBody>
+      </p:sp>
+      <p:sp>
+        <p:nvSpPr>
+          <p:cNvPr id="3" name="Content Placeholder 2"/>
+          <p:cNvSpPr>
+            <a:spLocks noGrp="1"/>
+          </p:cNvSpPr>
+          <p:nvPr>
+            <p:ph idx="1"/>
+          </p:nvPr>
+        </p:nvSpPr>
+        <p:spPr>
+          <a:xfrm>
+            <a:off x="838200" y="1825625"/>
+            <a:ext cx="3489960" cy="4351338"/>
+          </a:xfrm>
+        </p:spPr>
+        <p:txBody>
+          <a:bodyPr/>
+          <a:lstStyle/>
+          <a:p>
+            <a:r>
+              <a:rPr lang="en-US" dirty="0" smtClean="0">
+                <a:latin typeface="Times New Roman" panose="02020603050405020304" pitchFamily="18" charset="0"/>
+                <a:cs typeface="Times New Roman" panose="02020603050405020304" pitchFamily="18" charset="0"/>
+              </a:rPr>
+              <a:t>Chức năng đăng ký</a:t>
+            </a:r>
+            <a:endParaRPr lang="en-US" dirty="0">
+              <a:latin typeface="Times New Roman" panose="02020603050405020304" pitchFamily="18" charset="0"/>
+              <a:cs typeface="Times New Roman" panose="02020603050405020304" pitchFamily="18" charset="0"/>
+            </a:endParaRPr>
+          </a:p>
+        </p:txBody>
+      </p:sp>
+      <p:pic>
+        <p:nvPicPr>
+          <p:cNvPr id="4" name="Picture 3"/>
+          <p:cNvPicPr>
+            <a:picLocks noChangeAspect="1"/>
+          </p:cNvPicPr>
+          <p:nvPr/>
+        </p:nvPicPr>
+        <p:blipFill>
+          <a:blip r:embed="rId2">
+            <a:extLst>
+              <a:ext uri="{28A0092B-C50C-407E-A947-70E740481C1C}">
+                <a14:useLocalDpi xmlns:a14="http://schemas.microsoft.com/office/drawing/2010/main" val="0"/>
+              </a:ext>
+            </a:extLst>
+          </a:blip>
+          <a:stretch>
+            <a:fillRect/>
+          </a:stretch>
+        </p:blipFill>
+        <p:spPr>
+          <a:xfrm>
+            <a:off x="5012824" y="2251018"/>
+            <a:ext cx="5768388" cy="3500551"/>
+          </a:xfrm>
+          <a:prstGeom prst="rect">
+            <a:avLst/>
+          </a:prstGeom>
+        </p:spPr>
+      </p:pic>
+    </p:spTree>
+    <p:extLst>
+      <p:ext uri="{BB962C8B-B14F-4D97-AF65-F5344CB8AC3E}">
+        <p14:creationId xmlns:p14="http://schemas.microsoft.com/office/powerpoint/2010/main" val="1284203981"/>
+      </p:ext>
+    </p:extLst>
+  </p:cSld>
+  <p:clrMapOvr>
+    <a:masterClrMapping/>
+  </p:clrMapOvr>
+</p:sld>
+</file>
+
+<file path=ppt/slides/slide12.xml><?xml version="1.0" encoding="utf-8"?>
+<p:sld xmlns:a="http://schemas.openxmlformats.org/drawingml/2006/main" xmlns:r="http://schemas.openxmlformats.org/officeDocument/2006/relationships" xmlns:p="http://schemas.openxmlformats.org/presentationml/2006/main">
+  <p:cSld>
+    <p:spTree>
+      <p:nvGrpSpPr>
+        <p:cNvPr id="1" name=""/>
+        <p:cNvGrpSpPr/>
+        <p:nvPr/>
+      </p:nvGrpSpPr>
+      <p:grpSpPr>
+        <a:xfrm>
+          <a:off x="0" y="0"/>
+          <a:ext cx="0" cy="0"/>
+          <a:chOff x="0" y="0"/>
+          <a:chExt cx="0" cy="0"/>
+        </a:xfrm>
+      </p:grpSpPr>
+      <p:sp>
+        <p:nvSpPr>
+          <p:cNvPr id="2" name="Title 1"/>
+          <p:cNvSpPr>
+            <a:spLocks noGrp="1"/>
+          </p:cNvSpPr>
+          <p:nvPr>
+            <p:ph type="title"/>
+          </p:nvPr>
+        </p:nvSpPr>
+        <p:spPr/>
+        <p:txBody>
+          <a:bodyPr>
+            <a:noAutofit/>
+          </a:bodyPr>
+          <a:lstStyle/>
+          <a:p>
+            <a:r>
+              <a:rPr lang="en-US" sz="3200" dirty="0">
+                <a:latin typeface="Times New Roman" panose="02020603050405020304" pitchFamily="18" charset="0"/>
+                <a:cs typeface="Times New Roman" panose="02020603050405020304" pitchFamily="18" charset="0"/>
+              </a:rPr>
+              <a:t>2.</a:t>
+            </a:r>
+            <a:r>
+              <a:rPr lang="vi-VN" sz="3200" dirty="0">
+                <a:cs typeface="Times New Roman" panose="02020603050405020304" pitchFamily="18" charset="0"/>
+              </a:rPr>
+              <a:t> Trình bày bản phân phối phần mềm đầu tiên đến khách hàng của</a:t>
+            </a:r>
+            <a:r>
+              <a:rPr lang="en-US" sz="3200" dirty="0">
+                <a:latin typeface="Times New Roman" panose="02020603050405020304" pitchFamily="18" charset="0"/>
+                <a:cs typeface="Times New Roman" panose="02020603050405020304" pitchFamily="18" charset="0"/>
+              </a:rPr>
+              <a:t> </a:t>
+            </a:r>
+            <a:r>
+              <a:rPr lang="vi-VN" sz="3200" dirty="0">
+                <a:cs typeface="Times New Roman" panose="02020603050405020304" pitchFamily="18" charset="0"/>
+              </a:rPr>
+              <a:t>nhóm (Demo khách hàng trực tiếp sử dụng phần mềm, Hướng dẫn sử</a:t>
+            </a:r>
+            <a:r>
+              <a:rPr lang="en-US" sz="3200" dirty="0">
+                <a:latin typeface="Times New Roman" panose="02020603050405020304" pitchFamily="18" charset="0"/>
+                <a:cs typeface="Times New Roman" panose="02020603050405020304" pitchFamily="18" charset="0"/>
+              </a:rPr>
+              <a:t> </a:t>
+            </a:r>
+            <a:r>
+              <a:rPr lang="vi-VN" sz="3200" dirty="0">
+                <a:cs typeface="Times New Roman" panose="02020603050405020304" pitchFamily="18" charset="0"/>
+              </a:rPr>
+              <a:t>dụng phần mềm, và mã nguồn).</a:t>
+            </a:r>
+            <a:endParaRPr lang="en-US" sz="3200" dirty="0"/>
+          </a:p>
+        </p:txBody>
+      </p:sp>
+      <p:sp>
+        <p:nvSpPr>
+          <p:cNvPr id="3" name="Content Placeholder 2"/>
+          <p:cNvSpPr>
+            <a:spLocks noGrp="1"/>
+          </p:cNvSpPr>
+          <p:nvPr>
+            <p:ph idx="1"/>
+          </p:nvPr>
+        </p:nvSpPr>
+        <p:spPr>
+          <a:xfrm>
+            <a:off x="182880" y="1825625"/>
+            <a:ext cx="4093029" cy="4351338"/>
+          </a:xfrm>
+        </p:spPr>
+        <p:txBody>
+          <a:bodyPr/>
+          <a:lstStyle/>
+          <a:p>
+            <a:r>
+              <a:rPr lang="en-US" dirty="0" smtClean="0"/>
+              <a:t>Chức năng cài đặt thông tin cá nhân</a:t>
+            </a:r>
+            <a:endParaRPr lang="en-US" dirty="0"/>
+          </a:p>
+        </p:txBody>
+      </p:sp>
+      <p:pic>
+        <p:nvPicPr>
+          <p:cNvPr id="4" name="Picture 3"/>
+          <p:cNvPicPr>
+            <a:picLocks noChangeAspect="1"/>
+          </p:cNvPicPr>
+          <p:nvPr/>
+        </p:nvPicPr>
+        <p:blipFill>
+          <a:blip r:embed="rId2">
+            <a:extLst>
+              <a:ext uri="{28A0092B-C50C-407E-A947-70E740481C1C}">
+                <a14:useLocalDpi xmlns:a14="http://schemas.microsoft.com/office/drawing/2010/main" val="0"/>
+              </a:ext>
+            </a:extLst>
+          </a:blip>
+          <a:stretch>
+            <a:fillRect/>
+          </a:stretch>
+        </p:blipFill>
+        <p:spPr>
+          <a:xfrm>
+            <a:off x="513572" y="3148385"/>
+            <a:ext cx="4075246" cy="2268346"/>
+          </a:xfrm>
+          <a:prstGeom prst="rect">
+            <a:avLst/>
+          </a:prstGeom>
+        </p:spPr>
+      </p:pic>
+      <p:pic>
+        <p:nvPicPr>
+          <p:cNvPr id="5" name="Picture 4"/>
+          <p:cNvPicPr>
+            <a:picLocks noChangeAspect="1"/>
+          </p:cNvPicPr>
+          <p:nvPr/>
+        </p:nvPicPr>
+        <p:blipFill>
+          <a:blip r:embed="rId3">
+            <a:extLst>
+              <a:ext uri="{28A0092B-C50C-407E-A947-70E740481C1C}">
+                <a14:useLocalDpi xmlns:a14="http://schemas.microsoft.com/office/drawing/2010/main" val="0"/>
+              </a:ext>
+            </a:extLst>
+          </a:blip>
+          <a:stretch>
+            <a:fillRect/>
+          </a:stretch>
+        </p:blipFill>
+        <p:spPr>
+          <a:xfrm>
+            <a:off x="5474568" y="1966572"/>
+            <a:ext cx="4575123" cy="2034722"/>
+          </a:xfrm>
+          <a:prstGeom prst="rect">
+            <a:avLst/>
+          </a:prstGeom>
+        </p:spPr>
+      </p:pic>
+      <p:pic>
+        <p:nvPicPr>
+          <p:cNvPr id="6" name="Picture 5"/>
+          <p:cNvPicPr>
+            <a:picLocks noChangeAspect="1"/>
+          </p:cNvPicPr>
+          <p:nvPr/>
+        </p:nvPicPr>
+        <p:blipFill>
+          <a:blip r:embed="rId4">
+            <a:extLst>
+              <a:ext uri="{28A0092B-C50C-407E-A947-70E740481C1C}">
+                <a14:useLocalDpi xmlns:a14="http://schemas.microsoft.com/office/drawing/2010/main" val="0"/>
+              </a:ext>
+            </a:extLst>
+          </a:blip>
+          <a:stretch>
+            <a:fillRect/>
+          </a:stretch>
+        </p:blipFill>
+        <p:spPr>
+          <a:xfrm>
+            <a:off x="5283926" y="4420803"/>
+            <a:ext cx="4765765" cy="2340893"/>
+          </a:xfrm>
+          <a:prstGeom prst="rect">
+            <a:avLst/>
+          </a:prstGeom>
+        </p:spPr>
+      </p:pic>
+    </p:spTree>
+    <p:extLst>
+      <p:ext uri="{BB962C8B-B14F-4D97-AF65-F5344CB8AC3E}">
+        <p14:creationId xmlns:p14="http://schemas.microsoft.com/office/powerpoint/2010/main" val="2239904390"/>
+      </p:ext>
+    </p:extLst>
+  </p:cSld>
+  <p:clrMapOvr>
+    <a:masterClrMapping/>
+  </p:clrMapOvr>
+</p:sld>
+</file>
+
+<file path=ppt/slides/slide13.xml><?xml version="1.0" encoding="utf-8"?>
+<p:sld xmlns:a="http://schemas.openxmlformats.org/drawingml/2006/main" xmlns:r="http://schemas.openxmlformats.org/officeDocument/2006/relationships" xmlns:p="http://schemas.openxmlformats.org/presentationml/2006/main">
+  <p:cSld>
+    <p:spTree>
+      <p:nvGrpSpPr>
+        <p:cNvPr id="1" name=""/>
+        <p:cNvGrpSpPr/>
+        <p:nvPr/>
+      </p:nvGrpSpPr>
+      <p:grpSpPr>
+        <a:xfrm>
+          <a:off x="0" y="0"/>
+          <a:ext cx="0" cy="0"/>
+          <a:chOff x="0" y="0"/>
+          <a:chExt cx="0" cy="0"/>
+        </a:xfrm>
+      </p:grpSpPr>
+      <p:sp>
+        <p:nvSpPr>
+          <p:cNvPr id="2" name="Title 1"/>
+          <p:cNvSpPr>
+            <a:spLocks noGrp="1"/>
+          </p:cNvSpPr>
+          <p:nvPr>
+            <p:ph type="title"/>
+          </p:nvPr>
+        </p:nvSpPr>
         <p:spPr/>
         <p:txBody>
           <a:bodyPr/>
@@ -3593,7 +4970,14 @@
                 <a:latin typeface="Times New Roman" panose="02020603050405020304" pitchFamily="18" charset="0"/>
                 <a:cs typeface="Times New Roman" panose="02020603050405020304" pitchFamily="18" charset="0"/>
               </a:rPr>
-              <a:t>3.Trình bày sản phẩm</a:t>
+              <a:t>3.Trình bày </a:t>
+            </a:r>
+            <a:r>
+              <a:rPr lang="en-US" dirty="0" smtClean="0">
+                <a:latin typeface="Times New Roman" panose="02020603050405020304" pitchFamily="18" charset="0"/>
+                <a:cs typeface="Times New Roman" panose="02020603050405020304" pitchFamily="18" charset="0"/>
+              </a:rPr>
+              <a:t>Release Burn Down </a:t>
             </a:r>
             <a:endParaRPr lang="en-US" dirty="0">
               <a:latin typeface="Times New Roman" panose="02020603050405020304" pitchFamily="18" charset="0"/>
@@ -3632,40 +5016,28 @@
           </a:p>
         </p:txBody>
       </p:sp>
-      <p:pic>
-        <p:nvPicPr>
-          <p:cNvPr id="4" name="Picture 3">
-            <a:extLst>
-              <a:ext uri="{FF2B5EF4-FFF2-40B4-BE49-F238E27FC236}">
-                <a16:creationId xmlns:a16="http://schemas.microsoft.com/office/drawing/2014/main" id="{71AECA97-C69B-4819-8843-46F4B9C8C2CC}"/>
-              </a:ext>
-            </a:extLst>
-          </p:cNvPr>
-          <p:cNvPicPr>
-            <a:picLocks noChangeAspect="1"/>
-          </p:cNvPicPr>
+      <p:graphicFrame>
+        <p:nvGraphicFramePr>
+          <p:cNvPr id="6" name="Chart 5"/>
+          <p:cNvGraphicFramePr>
+            <a:graphicFrameLocks/>
+          </p:cNvGraphicFramePr>
           <p:nvPr/>
-        </p:nvPicPr>
-        <p:blipFill>
-          <a:blip r:embed="rId2"/>
-          <a:stretch>
-            <a:fillRect/>
-          </a:stretch>
-        </p:blipFill>
-        <p:spPr>
-          <a:xfrm>
-            <a:off x="4792784" y="1596882"/>
-            <a:ext cx="6892560" cy="3963222"/>
-          </a:xfrm>
-          <a:prstGeom prst="rect">
-            <a:avLst/>
-          </a:prstGeom>
-        </p:spPr>
-      </p:pic>
+        </p:nvGraphicFramePr>
+        <p:xfrm>
+          <a:off x="4097381" y="1909353"/>
+          <a:ext cx="7119258" cy="4125687"/>
+        </p:xfrm>
+        <a:graphic>
+          <a:graphicData uri="http://schemas.openxmlformats.org/drawingml/2006/chart">
+            <c:chart xmlns:c="http://schemas.openxmlformats.org/drawingml/2006/chart" xmlns:r="http://schemas.openxmlformats.org/officeDocument/2006/relationships" r:id="rId2"/>
+          </a:graphicData>
+        </a:graphic>
+      </p:graphicFrame>
     </p:spTree>
     <p:extLst>
       <p:ext uri="{BB962C8B-B14F-4D97-AF65-F5344CB8AC3E}">
-        <p14:creationId xmlns:p14="http://schemas.microsoft.com/office/powerpoint/2010/main" val="3759484552"/>
+        <p14:creationId xmlns:p14="http://schemas.microsoft.com/office/powerpoint/2010/main" val="908112683"/>
       </p:ext>
     </p:extLst>
   </p:cSld>
@@ -3675,7 +5047,158 @@
 </p:sld>
 </file>
 
-<file path=ppt/slides/slide12.xml><?xml version="1.0" encoding="utf-8"?>
+<file path=ppt/slides/slide14.xml><?xml version="1.0" encoding="utf-8"?>
+<p:sld xmlns:a="http://schemas.openxmlformats.org/drawingml/2006/main" xmlns:r="http://schemas.openxmlformats.org/officeDocument/2006/relationships" xmlns:p="http://schemas.openxmlformats.org/presentationml/2006/main">
+  <p:cSld>
+    <p:spTree>
+      <p:nvGrpSpPr>
+        <p:cNvPr id="1" name=""/>
+        <p:cNvGrpSpPr/>
+        <p:nvPr/>
+      </p:nvGrpSpPr>
+      <p:grpSpPr>
+        <a:xfrm>
+          <a:off x="0" y="0"/>
+          <a:ext cx="0" cy="0"/>
+          <a:chOff x="0" y="0"/>
+          <a:chExt cx="0" cy="0"/>
+        </a:xfrm>
+      </p:grpSpPr>
+      <p:sp>
+        <p:nvSpPr>
+          <p:cNvPr id="2" name="Title 1">
+            <a:extLst>
+              <a:ext uri="{FF2B5EF4-FFF2-40B4-BE49-F238E27FC236}">
+                <a16:creationId xmlns:a16="http://schemas.microsoft.com/office/drawing/2014/main" id="{323C768A-D3DF-4EB2-A78C-BA2018CDE498}"/>
+              </a:ext>
+            </a:extLst>
+          </p:cNvPr>
+          <p:cNvSpPr>
+            <a:spLocks noGrp="1"/>
+          </p:cNvSpPr>
+          <p:nvPr>
+            <p:ph type="title"/>
+          </p:nvPr>
+        </p:nvSpPr>
+        <p:spPr>
+          <a:xfrm>
+            <a:off x="1097280" y="286603"/>
+            <a:ext cx="10154194" cy="1124185"/>
+          </a:xfrm>
+        </p:spPr>
+        <p:txBody>
+          <a:bodyPr>
+            <a:noAutofit/>
+          </a:bodyPr>
+          <a:lstStyle/>
+          <a:p>
+            <a:r>
+              <a:rPr lang="en-US" sz="2400" dirty="0">
+                <a:latin typeface="Times New Roman" panose="02020603050405020304" pitchFamily="18" charset="0"/>
+                <a:cs typeface="Times New Roman" panose="02020603050405020304" pitchFamily="18" charset="0"/>
+              </a:rPr>
+              <a:t>3. Trình bày </a:t>
+            </a:r>
+            <a:r>
+              <a:rPr lang="en-US" sz="2400" dirty="0">
+                <a:latin typeface="Times New Roman" panose="02020603050405020304" pitchFamily="18" charset="0"/>
+                <a:cs typeface="Times New Roman" panose="02020603050405020304" pitchFamily="18" charset="0"/>
+              </a:rPr>
+              <a:t>Tốc lực (Velocity) của nhóm, năng suất làm việc của nhóm, tình trạng ngân sách và chi phí của nhóm, cập nhập sản phẩm Product Backlog, cập nhập sản phẩm “Kế hoạch phân phối (Release Plan)” của </a:t>
+            </a:r>
+            <a:r>
+              <a:rPr lang="en-US" sz="2400" dirty="0" smtClean="0">
+                <a:latin typeface="Times New Roman" panose="02020603050405020304" pitchFamily="18" charset="0"/>
+                <a:cs typeface="Times New Roman" panose="02020603050405020304" pitchFamily="18" charset="0"/>
+              </a:rPr>
+              <a:t>nhóm</a:t>
+            </a:r>
+            <a:endParaRPr lang="en-US" sz="2400" dirty="0">
+              <a:latin typeface="Times New Roman" panose="02020603050405020304" pitchFamily="18" charset="0"/>
+              <a:cs typeface="Times New Roman" panose="02020603050405020304" pitchFamily="18" charset="0"/>
+            </a:endParaRPr>
+          </a:p>
+        </p:txBody>
+      </p:sp>
+      <p:sp>
+        <p:nvSpPr>
+          <p:cNvPr id="3" name="Content Placeholder 2">
+            <a:extLst>
+              <a:ext uri="{FF2B5EF4-FFF2-40B4-BE49-F238E27FC236}">
+                <a16:creationId xmlns:a16="http://schemas.microsoft.com/office/drawing/2014/main" id="{3FA59283-35F5-4AD8-8988-F13FF907F789}"/>
+              </a:ext>
+            </a:extLst>
+          </p:cNvPr>
+          <p:cNvSpPr>
+            <a:spLocks noGrp="1"/>
+          </p:cNvSpPr>
+          <p:nvPr>
+            <p:ph idx="1"/>
+          </p:nvPr>
+        </p:nvSpPr>
+        <p:spPr>
+          <a:xfrm>
+            <a:off x="838200" y="1480457"/>
+            <a:ext cx="10515600" cy="4696506"/>
+          </a:xfrm>
+        </p:spPr>
+        <p:txBody>
+          <a:bodyPr/>
+          <a:lstStyle/>
+          <a:p>
+            <a:r>
+              <a:rPr lang="en-US" sz="2000" dirty="0" smtClean="0">
+                <a:latin typeface="Times New Roman" panose="02020603050405020304" pitchFamily="18" charset="0"/>
+                <a:cs typeface="Times New Roman" panose="02020603050405020304" pitchFamily="18" charset="0"/>
+              </a:rPr>
+              <a:t>Nhóm có tất cả 52 point với 8 tuần để làm =&gt; Tốc lực là 6.5 point/tuần</a:t>
+            </a:r>
+          </a:p>
+          <a:p>
+            <a:r>
+              <a:rPr lang="en-US" sz="2000" dirty="0" smtClean="0">
+                <a:latin typeface="Times New Roman" panose="02020603050405020304" pitchFamily="18" charset="0"/>
+                <a:cs typeface="Times New Roman" panose="02020603050405020304" pitchFamily="18" charset="0"/>
+              </a:rPr>
+              <a:t>Ngân sách của nhóm cho dự án là 13 triệu VNĐ</a:t>
+            </a:r>
+            <a:endParaRPr lang="en-US" sz="2000" dirty="0">
+              <a:latin typeface="Times New Roman" panose="02020603050405020304" pitchFamily="18" charset="0"/>
+              <a:cs typeface="Times New Roman" panose="02020603050405020304" pitchFamily="18" charset="0"/>
+            </a:endParaRPr>
+          </a:p>
+          <a:p>
+            <a:pPr marL="0" indent="0">
+              <a:buNone/>
+            </a:pPr>
+            <a:r>
+              <a:rPr lang="vi-VN" dirty="0">
+                <a:latin typeface="Times New Roman" panose="02020603050405020304" pitchFamily="18" charset="0"/>
+                <a:cs typeface="Times New Roman" panose="02020603050405020304" pitchFamily="18" charset="0"/>
+              </a:rPr>
+              <a:t> </a:t>
+            </a:r>
+            <a:endParaRPr lang="en-US" dirty="0">
+              <a:latin typeface="Times New Roman" panose="02020603050405020304" pitchFamily="18" charset="0"/>
+              <a:cs typeface="Times New Roman" panose="02020603050405020304" pitchFamily="18" charset="0"/>
+            </a:endParaRPr>
+          </a:p>
+        </p:txBody>
+      </p:sp>
+    </p:spTree>
+    <p:extLst>
+      <p:ext uri="{BB962C8B-B14F-4D97-AF65-F5344CB8AC3E}">
+        <p14:creationId xmlns:p14="http://schemas.microsoft.com/office/powerpoint/2010/main" val="2511327418"/>
+      </p:ext>
+    </p:extLst>
+  </p:cSld>
+  <p:clrMapOvr>
+    <a:masterClrMapping/>
+  </p:clrMapOvr>
+</p:sld>
+</file>
+
+<file path=ppt/slides/slide15.xml><?xml version="1.0" encoding="utf-8"?>
 <p:sld xmlns:a="http://schemas.openxmlformats.org/drawingml/2006/main" xmlns:r="http://schemas.openxmlformats.org/officeDocument/2006/relationships" xmlns:p="http://schemas.openxmlformats.org/presentationml/2006/main">
   <p:cSld>
     <p:spTree>
@@ -4537,22 +6060,13 @@
                         </a:spcAft>
                       </a:pPr>
                       <a:r>
-                        <a:rPr lang="en-US" sz="1200" dirty="0" err="1">
-                          <a:effectLst/>
-                        </a:rPr>
-                        <a:t>Đang</a:t>
-                      </a:r>
-                      <a:r>
-                        <a:rPr lang="en-US" sz="1200" dirty="0">
-                          <a:effectLst/>
-                        </a:rPr>
-                        <a:t> </a:t>
-                      </a:r>
-                      <a:r>
-                        <a:rPr lang="en-US" sz="1200" dirty="0" err="1">
-                          <a:effectLst/>
-                        </a:rPr>
-                        <a:t>làm</a:t>
+                        <a:rPr lang="en-US" sz="1200" dirty="0" smtClean="0">
+                          <a:effectLst/>
+                          <a:latin typeface="Calibri" panose="020F0502020204030204" pitchFamily="34" charset="0"/>
+                          <a:ea typeface="Calibri" panose="020F0502020204030204" pitchFamily="34" charset="0"/>
+                          <a:cs typeface="Times New Roman" panose="02020603050405020304" pitchFamily="18" charset="0"/>
+                        </a:rPr>
+                        <a:t>Hoàn thành</a:t>
                       </a:r>
                       <a:endParaRPr lang="en-US" sz="1100" dirty="0">
                         <a:effectLst/>
@@ -4581,12 +6095,18 @@
                         </a:spcAft>
                       </a:pPr>
                       <a:r>
-                        <a:rPr lang="en-US" sz="1200">
-                          <a:effectLst/>
-                        </a:rPr>
-                        <a:t>30%</a:t>
-                      </a:r>
-                      <a:endParaRPr lang="en-US" sz="1100">
+                        <a:rPr lang="en-US" sz="1200" dirty="0" smtClean="0">
+                          <a:effectLst/>
+                        </a:rPr>
+                        <a:t>100</a:t>
+                      </a:r>
+                      <a:r>
+                        <a:rPr lang="en-US" sz="1200" dirty="0">
+                          <a:effectLst/>
+                        </a:rPr>
+                        <a:t>%</a:t>
+                      </a:r>
+                      <a:endParaRPr lang="en-US" sz="1100" dirty="0">
                         <a:effectLst/>
                         <a:latin typeface="Calibri" panose="020F0502020204030204" pitchFamily="34" charset="0"/>
                         <a:ea typeface="Calibri" panose="020F0502020204030204" pitchFamily="34" charset="0"/>
@@ -4888,12 +6408,24 @@
                         </a:spcAft>
                       </a:pPr>
                       <a:r>
-                        <a:rPr lang="en-US" sz="1200">
-                          <a:effectLst/>
-                        </a:rPr>
-                        <a:t>30%</a:t>
-                      </a:r>
-                      <a:endParaRPr lang="en-US" sz="1100">
+                        <a:rPr lang="en-US" sz="1200" dirty="0">
+                          <a:effectLst/>
+                        </a:rPr>
+                        <a:t>5</a:t>
+                      </a:r>
+                      <a:r>
+                        <a:rPr lang="en-US" sz="1200" dirty="0" smtClean="0">
+                          <a:effectLst/>
+                        </a:rPr>
+                        <a:t>0</a:t>
+                      </a:r>
+                      <a:r>
+                        <a:rPr lang="en-US" sz="1200" dirty="0">
+                          <a:effectLst/>
+                        </a:rPr>
+                        <a:t>%</a:t>
+                      </a:r>
+                      <a:endParaRPr lang="en-US" sz="1100" dirty="0">
                         <a:effectLst/>
                         <a:latin typeface="Calibri" panose="020F0502020204030204" pitchFamily="34" charset="0"/>
                         <a:ea typeface="Calibri" panose="020F0502020204030204" pitchFamily="34" charset="0"/>
@@ -5144,10 +6676,10 @@
                         </a:spcAft>
                       </a:pPr>
                       <a:r>
-                        <a:rPr lang="en-US" sz="1200" dirty="0">
-                          <a:effectLst/>
-                        </a:rPr>
-                        <a:t>100%</a:t>
+                        <a:rPr lang="en-US" sz="1200" dirty="0" smtClean="0">
+                          <a:effectLst/>
+                        </a:rPr>
+                        <a:t>0%</a:t>
                       </a:r>
                       <a:endParaRPr lang="en-US" sz="1100" dirty="0">
                         <a:effectLst/>
@@ -5379,12 +6911,24 @@
                         </a:spcAft>
                       </a:pPr>
                       <a:r>
-                        <a:rPr lang="en-US" sz="1200">
-                          <a:effectLst/>
-                        </a:rPr>
-                        <a:t>30%</a:t>
-                      </a:r>
-                      <a:endParaRPr lang="en-US" sz="1100">
+                        <a:rPr lang="en-US" sz="1200" dirty="0">
+                          <a:effectLst/>
+                        </a:rPr>
+                        <a:t>5</a:t>
+                      </a:r>
+                      <a:r>
+                        <a:rPr lang="en-US" sz="1200" dirty="0" smtClean="0">
+                          <a:effectLst/>
+                        </a:rPr>
+                        <a:t>0</a:t>
+                      </a:r>
+                      <a:r>
+                        <a:rPr lang="en-US" sz="1200" dirty="0">
+                          <a:effectLst/>
+                        </a:rPr>
+                        <a:t>%</a:t>
+                      </a:r>
+                      <a:endParaRPr lang="en-US" sz="1100" dirty="0">
                         <a:effectLst/>
                         <a:latin typeface="Calibri" panose="020F0502020204030204" pitchFamily="34" charset="0"/>
                         <a:ea typeface="Calibri" panose="020F0502020204030204" pitchFamily="34" charset="0"/>
@@ -5626,12 +7170,18 @@
                         </a:spcAft>
                       </a:pPr>
                       <a:r>
-                        <a:rPr lang="en-US" sz="1200">
-                          <a:effectLst/>
-                        </a:rPr>
-                        <a:t>10%</a:t>
-                      </a:r>
-                      <a:endParaRPr lang="en-US" sz="1100">
+                        <a:rPr lang="en-US" sz="1200" dirty="0" smtClean="0">
+                          <a:effectLst/>
+                        </a:rPr>
+                        <a:t>0</a:t>
+                      </a:r>
+                      <a:r>
+                        <a:rPr lang="en-US" sz="1200" dirty="0">
+                          <a:effectLst/>
+                        </a:rPr>
+                        <a:t>%</a:t>
+                      </a:r>
+                      <a:endParaRPr lang="en-US" sz="1100" dirty="0">
                         <a:effectLst/>
                         <a:latin typeface="Calibri" panose="020F0502020204030204" pitchFamily="34" charset="0"/>
                         <a:ea typeface="Calibri" panose="020F0502020204030204" pitchFamily="34" charset="0"/>
@@ -5897,12 +7447,18 @@
                         </a:spcAft>
                       </a:pPr>
                       <a:r>
-                        <a:rPr lang="en-US" sz="1200">
-                          <a:effectLst/>
-                        </a:rPr>
-                        <a:t>30%</a:t>
-                      </a:r>
-                      <a:endParaRPr lang="en-US" sz="1100">
+                        <a:rPr lang="en-US" sz="1200" dirty="0" smtClean="0">
+                          <a:effectLst/>
+                        </a:rPr>
+                        <a:t>0</a:t>
+                      </a:r>
+                      <a:r>
+                        <a:rPr lang="en-US" sz="1200" dirty="0">
+                          <a:effectLst/>
+                        </a:rPr>
+                        <a:t>%</a:t>
+                      </a:r>
+                      <a:endParaRPr lang="en-US" sz="1100" dirty="0">
                         <a:effectLst/>
                         <a:latin typeface="Calibri" panose="020F0502020204030204" pitchFamily="34" charset="0"/>
                         <a:ea typeface="Calibri" panose="020F0502020204030204" pitchFamily="34" charset="0"/>
@@ -6088,12 +7644,12 @@
                         </a:spcAft>
                       </a:pPr>
                       <a:r>
-                        <a:rPr lang="en-US" sz="1200">
+                        <a:rPr lang="en-US" sz="1200" dirty="0">
                           <a:effectLst/>
                         </a:rPr>
                         <a:t>Chưa làm</a:t>
                       </a:r>
-                      <a:endParaRPr lang="en-US" sz="1100">
+                      <a:endParaRPr lang="en-US" sz="1100" dirty="0">
                         <a:effectLst/>
                         <a:latin typeface="Calibri" panose="020F0502020204030204" pitchFamily="34" charset="0"/>
                         <a:ea typeface="Calibri" panose="020F0502020204030204" pitchFamily="34" charset="0"/>
@@ -6159,46 +7715,28 @@
                         </a:spcAft>
                       </a:pPr>
                       <a:r>
-                        <a:rPr lang="en-US" sz="1200" dirty="0" err="1">
-                          <a:effectLst/>
-                        </a:rPr>
-                        <a:t>Xem</a:t>
+                        <a:rPr lang="en-US" sz="1200" dirty="0" smtClean="0">
+                          <a:effectLst/>
+                        </a:rPr>
+                        <a:t>Cài</a:t>
+                      </a:r>
+                      <a:r>
+                        <a:rPr lang="en-US" sz="1200" baseline="0" dirty="0" smtClean="0">
+                          <a:effectLst/>
+                        </a:rPr>
+                        <a:t> đặt </a:t>
+                      </a:r>
+                      <a:r>
+                        <a:rPr lang="en-US" sz="1200" dirty="0" smtClean="0">
+                          <a:effectLst/>
+                        </a:rPr>
+                        <a:t>thông </a:t>
                       </a:r>
                       <a:r>
                         <a:rPr lang="en-US" sz="1200" dirty="0">
                           <a:effectLst/>
                         </a:rPr>
-                        <a:t> </a:t>
-                      </a:r>
-                      <a:r>
-                        <a:rPr lang="en-US" sz="1200" dirty="0" err="1">
-                          <a:effectLst/>
-                        </a:rPr>
-                        <a:t>thông</a:t>
-                      </a:r>
-                      <a:r>
-                        <a:rPr lang="en-US" sz="1200" dirty="0">
-                          <a:effectLst/>
-                        </a:rPr>
-                        <a:t> tin </a:t>
-                      </a:r>
-                      <a:r>
-                        <a:rPr lang="en-US" sz="1200" dirty="0" err="1">
-                          <a:effectLst/>
-                        </a:rPr>
-                        <a:t>cá</a:t>
-                      </a:r>
-                      <a:r>
-                        <a:rPr lang="en-US" sz="1200" dirty="0">
-                          <a:effectLst/>
-                        </a:rPr>
-                        <a:t> </a:t>
-                      </a:r>
-                      <a:r>
-                        <a:rPr lang="en-US" sz="1200" dirty="0" err="1">
-                          <a:effectLst/>
-                        </a:rPr>
-                        <a:t>nhân</a:t>
+                        <a:t>tin cá nhân</a:t>
                       </a:r>
                       <a:endParaRPr lang="en-US" sz="1100" dirty="0">
                         <a:effectLst/>
@@ -6227,10 +7765,16 @@
                         </a:spcAft>
                       </a:pPr>
                       <a:r>
+                        <a:rPr lang="en-US" sz="1200" dirty="0" smtClean="0">
+                          <a:effectLst/>
+                        </a:rPr>
+                        <a:t>Quản lý </a:t>
+                      </a:r>
+                      <a:r>
                         <a:rPr lang="en-US" sz="1200" dirty="0">
                           <a:effectLst/>
                         </a:rPr>
-                        <a:t>Xem thông tin cá nhân, biết được mình học những gì, điểm số, xếp hạng,...</a:t>
+                        <a:t>thông tin cá nhân, biết được mình học những gì, điểm số, xếp hạng,...</a:t>
                       </a:r>
                       <a:endParaRPr lang="en-US" sz="1100" dirty="0">
                         <a:effectLst/>
@@ -6311,7 +7855,7 @@
                     <a:bodyPr/>
                     <a:lstStyle/>
                     <a:p>
-                      <a:pPr marL="0" marR="0">
+                      <a:pPr marL="0" marR="0" lvl="0" indent="0" algn="l" defTabSz="914400" rtl="0" eaLnBrk="1" fontAlgn="auto" latinLnBrk="0" hangingPunct="1">
                         <a:lnSpc>
                           <a:spcPct val="107000"/>
                         </a:lnSpc>
@@ -6321,14 +7865,23 @@
                         <a:spcAft>
                           <a:spcPts val="0"/>
                         </a:spcAft>
+                        <a:buClrTx/>
+                        <a:buSzTx/>
+                        <a:buFontTx/>
+                        <a:buNone/>
+                        <a:tabLst/>
+                        <a:defRPr/>
                       </a:pPr>
                       <a:r>
-                        <a:rPr lang="en-US" sz="1200" dirty="0">
-                          <a:effectLst/>
-                        </a:rPr>
-                        <a:t>Chưa làm</a:t>
-                      </a:r>
-                      <a:endParaRPr lang="en-US" sz="1100" dirty="0">
+                        <a:rPr lang="en-US" sz="1200" dirty="0" smtClean="0">
+                          <a:effectLst/>
+                          <a:latin typeface="Calibri" panose="020F0502020204030204" pitchFamily="34" charset="0"/>
+                          <a:ea typeface="Calibri" panose="020F0502020204030204" pitchFamily="34" charset="0"/>
+                          <a:cs typeface="Times New Roman" panose="02020603050405020304" pitchFamily="18" charset="0"/>
+                        </a:rPr>
+                        <a:t>Hoàn thành</a:t>
+                      </a:r>
+                      <a:endParaRPr lang="en-US" sz="1100" dirty="0" smtClean="0">
                         <a:effectLst/>
                         <a:latin typeface="Calibri" panose="020F0502020204030204" pitchFamily="34" charset="0"/>
                         <a:ea typeface="Calibri" panose="020F0502020204030204" pitchFamily="34" charset="0"/>
@@ -6355,12 +7908,24 @@
                         </a:spcAft>
                       </a:pPr>
                       <a:r>
-                        <a:rPr lang="en-US" sz="1200">
+                        <a:rPr lang="en-US" sz="1200" dirty="0">
                           <a:effectLst/>
                         </a:rPr>
                         <a:t> </a:t>
                       </a:r>
-                      <a:endParaRPr lang="en-US" sz="1100">
+                      <a:r>
+                        <a:rPr lang="en-US" sz="1200" dirty="0" smtClean="0">
+                          <a:effectLst/>
+                        </a:rPr>
+                        <a:t>0</a:t>
+                      </a:r>
+                      <a:r>
+                        <a:rPr lang="en-US" sz="1200" dirty="0" smtClean="0">
+                          <a:effectLst/>
+                        </a:rPr>
+                        <a:t>%</a:t>
+                      </a:r>
+                      <a:endParaRPr lang="en-US" sz="1100" dirty="0">
                         <a:effectLst/>
                         <a:latin typeface="Calibri" panose="020F0502020204030204" pitchFamily="34" charset="0"/>
                         <a:ea typeface="Calibri" panose="020F0502020204030204" pitchFamily="34" charset="0"/>
@@ -6871,7 +8436,7 @@
     </p:spTree>
     <p:extLst>
       <p:ext uri="{BB962C8B-B14F-4D97-AF65-F5344CB8AC3E}">
-        <p14:creationId xmlns:p14="http://schemas.microsoft.com/office/powerpoint/2010/main" val="2654360883"/>
+        <p14:creationId xmlns:p14="http://schemas.microsoft.com/office/powerpoint/2010/main" val="1810531898"/>
       </p:ext>
     </p:extLst>
   </p:cSld>
@@ -6893,7 +8458,7 @@
 </p:sld>
 </file>
 
-<file path=ppt/slides/slide13.xml><?xml version="1.0" encoding="utf-8"?>
+<file path=ppt/slides/slide16.xml><?xml version="1.0" encoding="utf-8"?>
 <p:sld xmlns:a="http://schemas.openxmlformats.org/drawingml/2006/main" xmlns:r="http://schemas.openxmlformats.org/officeDocument/2006/relationships" xmlns:p="http://schemas.openxmlformats.org/presentationml/2006/main">
   <p:cSld>
     <p:spTree>
@@ -7406,12 +8971,18 @@
                         </a:spcAft>
                       </a:pPr>
                       <a:r>
-                        <a:rPr lang="en-US" sz="1600">
-                          <a:effectLst/>
-                        </a:rPr>
-                        <a:t>30%</a:t>
-                      </a:r>
-                      <a:endParaRPr lang="en-US" sz="1050">
+                        <a:rPr lang="en-US" sz="1600" dirty="0" smtClean="0">
+                          <a:effectLst/>
+                        </a:rPr>
+                        <a:t>100</a:t>
+                      </a:r>
+                      <a:r>
+                        <a:rPr lang="en-US" sz="1600" dirty="0">
+                          <a:effectLst/>
+                        </a:rPr>
+                        <a:t>%</a:t>
+                      </a:r>
+                      <a:endParaRPr lang="en-US" sz="1050" dirty="0">
                         <a:effectLst/>
                         <a:latin typeface="Calibri" panose="020F0502020204030204" pitchFamily="34" charset="0"/>
                         <a:ea typeface="Calibri" panose="020F0502020204030204" pitchFamily="34" charset="0"/>
@@ -7629,12 +9200,24 @@
                         </a:spcAft>
                       </a:pPr>
                       <a:r>
-                        <a:rPr lang="en-US" sz="1600">
-                          <a:effectLst/>
-                        </a:rPr>
-                        <a:t>30%</a:t>
-                      </a:r>
-                      <a:endParaRPr lang="en-US" sz="1050">
+                        <a:rPr lang="en-US" sz="1600" dirty="0">
+                          <a:effectLst/>
+                        </a:rPr>
+                        <a:t>5</a:t>
+                      </a:r>
+                      <a:r>
+                        <a:rPr lang="en-US" sz="1600" dirty="0" smtClean="0">
+                          <a:effectLst/>
+                        </a:rPr>
+                        <a:t>0</a:t>
+                      </a:r>
+                      <a:r>
+                        <a:rPr lang="en-US" sz="1600" dirty="0">
+                          <a:effectLst/>
+                        </a:rPr>
+                        <a:t>%</a:t>
+                      </a:r>
+                      <a:endParaRPr lang="en-US" sz="1050" dirty="0">
                         <a:effectLst/>
                         <a:latin typeface="Calibri" panose="020F0502020204030204" pitchFamily="34" charset="0"/>
                         <a:ea typeface="Calibri" panose="020F0502020204030204" pitchFamily="34" charset="0"/>
@@ -7828,12 +9411,18 @@
                         </a:spcAft>
                       </a:pPr>
                       <a:r>
-                        <a:rPr lang="en-US" sz="1600">
-                          <a:effectLst/>
-                        </a:rPr>
-                        <a:t>10%</a:t>
-                      </a:r>
-                      <a:endParaRPr lang="en-US" sz="1050">
+                        <a:rPr lang="en-US" sz="1600" dirty="0" smtClean="0">
+                          <a:effectLst/>
+                        </a:rPr>
+                        <a:t>0</a:t>
+                      </a:r>
+                      <a:r>
+                        <a:rPr lang="en-US" sz="1600" dirty="0">
+                          <a:effectLst/>
+                        </a:rPr>
+                        <a:t>%</a:t>
+                      </a:r>
+                      <a:endParaRPr lang="en-US" sz="1050" dirty="0">
                         <a:effectLst/>
                         <a:latin typeface="Calibri" panose="020F0502020204030204" pitchFamily="34" charset="0"/>
                         <a:ea typeface="Calibri" panose="020F0502020204030204" pitchFamily="34" charset="0"/>
@@ -7867,12 +9456,12 @@
                         </a:spcAft>
                       </a:pPr>
                       <a:r>
-                        <a:rPr lang="en-US" sz="1600">
+                        <a:rPr lang="en-US" sz="1600" dirty="0">
                           <a:effectLst/>
                         </a:rPr>
                         <a:t>Quản lý khoá học</a:t>
                       </a:r>
-                      <a:endParaRPr lang="en-US" sz="1050">
+                      <a:endParaRPr lang="en-US" sz="1050" dirty="0">
                         <a:effectLst/>
                         <a:latin typeface="Calibri" panose="020F0502020204030204" pitchFamily="34" charset="0"/>
                         <a:ea typeface="Calibri" panose="020F0502020204030204" pitchFamily="34" charset="0"/>
@@ -8066,12 +9655,12 @@
                         </a:spcAft>
                       </a:pPr>
                       <a:r>
-                        <a:rPr lang="en-US" sz="1600">
+                        <a:rPr lang="en-US" sz="1600" dirty="0">
                           <a:effectLst/>
                         </a:rPr>
                         <a:t>Quản lý bài tập</a:t>
                       </a:r>
-                      <a:endParaRPr lang="en-US" sz="1050">
+                      <a:endParaRPr lang="en-US" sz="1050" dirty="0">
                         <a:effectLst/>
                         <a:latin typeface="Calibri" panose="020F0502020204030204" pitchFamily="34" charset="0"/>
                         <a:ea typeface="Calibri" panose="020F0502020204030204" pitchFamily="34" charset="0"/>
@@ -8425,12 +10014,18 @@
                         </a:spcAft>
                       </a:pPr>
                       <a:r>
-                        <a:rPr lang="en-US" sz="1600">
-                          <a:effectLst/>
-                        </a:rPr>
-                        <a:t>10%</a:t>
-                      </a:r>
-                      <a:endParaRPr lang="en-US" sz="1050">
+                        <a:rPr lang="en-US" sz="1600" dirty="0" smtClean="0">
+                          <a:effectLst/>
+                        </a:rPr>
+                        <a:t>0</a:t>
+                      </a:r>
+                      <a:r>
+                        <a:rPr lang="en-US" sz="1600" dirty="0">
+                          <a:effectLst/>
+                        </a:rPr>
+                        <a:t>%</a:t>
+                      </a:r>
+                      <a:endParaRPr lang="en-US" sz="1050" dirty="0">
                         <a:effectLst/>
                         <a:latin typeface="Calibri" panose="020F0502020204030204" pitchFamily="34" charset="0"/>
                         <a:ea typeface="Calibri" panose="020F0502020204030204" pitchFamily="34" charset="0"/>
@@ -8851,7 +10446,7 @@
     </p:spTree>
     <p:extLst>
       <p:ext uri="{BB962C8B-B14F-4D97-AF65-F5344CB8AC3E}">
-        <p14:creationId xmlns:p14="http://schemas.microsoft.com/office/powerpoint/2010/main" val="3100062512"/>
+        <p14:creationId xmlns:p14="http://schemas.microsoft.com/office/powerpoint/2010/main" val="784173862"/>
       </p:ext>
     </p:extLst>
   </p:cSld>
@@ -8873,676 +10468,7 @@
 </p:sld>
 </file>
 
-<file path=ppt/slides/slide14.xml><?xml version="1.0" encoding="utf-8"?>
-<p:sld xmlns:a="http://schemas.openxmlformats.org/drawingml/2006/main" xmlns:r="http://schemas.openxmlformats.org/officeDocument/2006/relationships" xmlns:p="http://schemas.openxmlformats.org/presentationml/2006/main">
-  <p:cSld>
-    <p:spTree>
-      <p:nvGrpSpPr>
-        <p:cNvPr id="1" name=""/>
-        <p:cNvGrpSpPr/>
-        <p:nvPr/>
-      </p:nvGrpSpPr>
-      <p:grpSpPr>
-        <a:xfrm>
-          <a:off x="0" y="0"/>
-          <a:ext cx="0" cy="0"/>
-          <a:chOff x="0" y="0"/>
-          <a:chExt cx="0" cy="0"/>
-        </a:xfrm>
-      </p:grpSpPr>
-      <p:sp>
-        <p:nvSpPr>
-          <p:cNvPr id="2" name="Title 1">
-            <a:extLst>
-              <a:ext uri="{FF2B5EF4-FFF2-40B4-BE49-F238E27FC236}">
-                <a16:creationId xmlns:a16="http://schemas.microsoft.com/office/drawing/2014/main" id="{323C768A-D3DF-4EB2-A78C-BA2018CDE498}"/>
-              </a:ext>
-            </a:extLst>
-          </p:cNvPr>
-          <p:cNvSpPr>
-            <a:spLocks noGrp="1"/>
-          </p:cNvSpPr>
-          <p:nvPr>
-            <p:ph type="title"/>
-          </p:nvPr>
-        </p:nvSpPr>
-        <p:spPr>
-          <a:xfrm>
-            <a:off x="1097280" y="286604"/>
-            <a:ext cx="10058400" cy="798126"/>
-          </a:xfrm>
-        </p:spPr>
-        <p:txBody>
-          <a:bodyPr/>
-          <a:lstStyle/>
-          <a:p>
-            <a:r>
-              <a:rPr lang="en-US" dirty="0">
-                <a:latin typeface="Times New Roman" panose="02020603050405020304" pitchFamily="18" charset="0"/>
-                <a:cs typeface="Times New Roman" panose="02020603050405020304" pitchFamily="18" charset="0"/>
-              </a:rPr>
-              <a:t>3. </a:t>
-            </a:r>
-            <a:r>
-              <a:rPr lang="en-US" dirty="0" err="1">
-                <a:latin typeface="Times New Roman" panose="02020603050405020304" pitchFamily="18" charset="0"/>
-                <a:cs typeface="Times New Roman" panose="02020603050405020304" pitchFamily="18" charset="0"/>
-              </a:rPr>
-              <a:t>Trình</a:t>
-            </a:r>
-            <a:r>
-              <a:rPr lang="en-US" dirty="0">
-                <a:latin typeface="Times New Roman" panose="02020603050405020304" pitchFamily="18" charset="0"/>
-                <a:cs typeface="Times New Roman" panose="02020603050405020304" pitchFamily="18" charset="0"/>
-              </a:rPr>
-              <a:t> </a:t>
-            </a:r>
-            <a:r>
-              <a:rPr lang="en-US" dirty="0" err="1">
-                <a:latin typeface="Times New Roman" panose="02020603050405020304" pitchFamily="18" charset="0"/>
-                <a:cs typeface="Times New Roman" panose="02020603050405020304" pitchFamily="18" charset="0"/>
-              </a:rPr>
-              <a:t>bày</a:t>
-            </a:r>
-            <a:r>
-              <a:rPr lang="en-US" dirty="0">
-                <a:latin typeface="Times New Roman" panose="02020603050405020304" pitchFamily="18" charset="0"/>
-                <a:cs typeface="Times New Roman" panose="02020603050405020304" pitchFamily="18" charset="0"/>
-              </a:rPr>
-              <a:t> </a:t>
-            </a:r>
-            <a:r>
-              <a:rPr lang="en-US" dirty="0" err="1">
-                <a:latin typeface="Times New Roman" panose="02020603050405020304" pitchFamily="18" charset="0"/>
-                <a:cs typeface="Times New Roman" panose="02020603050405020304" pitchFamily="18" charset="0"/>
-              </a:rPr>
-              <a:t>sản</a:t>
-            </a:r>
-            <a:r>
-              <a:rPr lang="en-US" dirty="0">
-                <a:latin typeface="Times New Roman" panose="02020603050405020304" pitchFamily="18" charset="0"/>
-                <a:cs typeface="Times New Roman" panose="02020603050405020304" pitchFamily="18" charset="0"/>
-              </a:rPr>
-              <a:t> </a:t>
-            </a:r>
-            <a:r>
-              <a:rPr lang="en-US" dirty="0" err="1">
-                <a:latin typeface="Times New Roman" panose="02020603050405020304" pitchFamily="18" charset="0"/>
-                <a:cs typeface="Times New Roman" panose="02020603050405020304" pitchFamily="18" charset="0"/>
-              </a:rPr>
-              <a:t>phẩm</a:t>
-            </a:r>
-            <a:endParaRPr lang="en-US" dirty="0">
-              <a:latin typeface="Times New Roman" panose="02020603050405020304" pitchFamily="18" charset="0"/>
-              <a:cs typeface="Times New Roman" panose="02020603050405020304" pitchFamily="18" charset="0"/>
-            </a:endParaRPr>
-          </a:p>
-        </p:txBody>
-      </p:sp>
-      <p:sp>
-        <p:nvSpPr>
-          <p:cNvPr id="3" name="Content Placeholder 2">
-            <a:extLst>
-              <a:ext uri="{FF2B5EF4-FFF2-40B4-BE49-F238E27FC236}">
-                <a16:creationId xmlns:a16="http://schemas.microsoft.com/office/drawing/2014/main" id="{3FA59283-35F5-4AD8-8988-F13FF907F789}"/>
-              </a:ext>
-            </a:extLst>
-          </p:cNvPr>
-          <p:cNvSpPr>
-            <a:spLocks noGrp="1"/>
-          </p:cNvSpPr>
-          <p:nvPr>
-            <p:ph idx="1"/>
-          </p:nvPr>
-        </p:nvSpPr>
-        <p:spPr/>
-        <p:txBody>
-          <a:bodyPr/>
-          <a:lstStyle/>
-          <a:p>
-            <a:r>
-              <a:rPr lang="en-US" sz="2000" dirty="0">
-                <a:latin typeface="Times New Roman" panose="02020603050405020304" pitchFamily="18" charset="0"/>
-                <a:cs typeface="Times New Roman" panose="02020603050405020304" pitchFamily="18" charset="0"/>
-              </a:rPr>
-              <a:t>T</a:t>
-            </a:r>
-            <a:r>
-              <a:rPr lang="en-US" sz="2000" dirty="0" smtClean="0">
-                <a:latin typeface="Times New Roman" panose="02020603050405020304" pitchFamily="18" charset="0"/>
-                <a:cs typeface="Times New Roman" panose="02020603050405020304" pitchFamily="18" charset="0"/>
-              </a:rPr>
-              <a:t>ốc </a:t>
-            </a:r>
-            <a:r>
-              <a:rPr lang="en-US" sz="2000" dirty="0">
-                <a:latin typeface="Times New Roman" panose="02020603050405020304" pitchFamily="18" charset="0"/>
-                <a:cs typeface="Times New Roman" panose="02020603050405020304" pitchFamily="18" charset="0"/>
-              </a:rPr>
-              <a:t>lực (Velocity) của nhóm, năng suất làm việc của nhóm, tình trạng ngân sách và chi phí của nhóm, cập nhập sản phẩm Product Backlog, cập nhập sản phẩm “Kế hoạch phân phối (Release Plan)” của nhóm</a:t>
-            </a:r>
-          </a:p>
-          <a:p>
-            <a:r>
-              <a:rPr lang="en-US" sz="2000" dirty="0">
-                <a:latin typeface="Times New Roman" panose="02020603050405020304" pitchFamily="18" charset="0"/>
-                <a:cs typeface="Times New Roman" panose="02020603050405020304" pitchFamily="18" charset="0"/>
-              </a:rPr>
-              <a:t>Total point: 52</a:t>
-            </a:r>
-          </a:p>
-          <a:p>
-            <a:r>
-              <a:rPr lang="en-US" sz="2000" dirty="0" smtClean="0">
-                <a:latin typeface="Times New Roman" panose="02020603050405020304" pitchFamily="18" charset="0"/>
-                <a:cs typeface="Times New Roman" panose="02020603050405020304" pitchFamily="18" charset="0"/>
-              </a:rPr>
-              <a:t>Velocity: </a:t>
-            </a:r>
-            <a:r>
-              <a:rPr lang="en-US" sz="2000" dirty="0">
-                <a:latin typeface="Times New Roman" panose="02020603050405020304" pitchFamily="18" charset="0"/>
-                <a:cs typeface="Times New Roman" panose="02020603050405020304" pitchFamily="18" charset="0"/>
-              </a:rPr>
-              <a:t>6</a:t>
-            </a:r>
-          </a:p>
-          <a:p>
-            <a:r>
-              <a:rPr lang="en-US" sz="2000" dirty="0" err="1">
-                <a:latin typeface="Times New Roman" panose="02020603050405020304" pitchFamily="18" charset="0"/>
-                <a:cs typeface="Times New Roman" panose="02020603050405020304" pitchFamily="18" charset="0"/>
-              </a:rPr>
-              <a:t>Ngân</a:t>
-            </a:r>
-            <a:r>
-              <a:rPr lang="en-US" sz="2000" dirty="0">
-                <a:latin typeface="Times New Roman" panose="02020603050405020304" pitchFamily="18" charset="0"/>
-                <a:cs typeface="Times New Roman" panose="02020603050405020304" pitchFamily="18" charset="0"/>
-              </a:rPr>
-              <a:t> </a:t>
-            </a:r>
-            <a:r>
-              <a:rPr lang="en-US" sz="2000" dirty="0" err="1">
-                <a:latin typeface="Times New Roman" panose="02020603050405020304" pitchFamily="18" charset="0"/>
-                <a:cs typeface="Times New Roman" panose="02020603050405020304" pitchFamily="18" charset="0"/>
-              </a:rPr>
-              <a:t>sách</a:t>
-            </a:r>
-            <a:r>
-              <a:rPr lang="en-US" sz="2000" dirty="0">
-                <a:latin typeface="Times New Roman" panose="02020603050405020304" pitchFamily="18" charset="0"/>
-                <a:cs typeface="Times New Roman" panose="02020603050405020304" pitchFamily="18" charset="0"/>
-              </a:rPr>
-              <a:t> </a:t>
-            </a:r>
-            <a:r>
-              <a:rPr lang="en-US" sz="2000" dirty="0" err="1">
-                <a:latin typeface="Times New Roman" panose="02020603050405020304" pitchFamily="18" charset="0"/>
-                <a:cs typeface="Times New Roman" panose="02020603050405020304" pitchFamily="18" charset="0"/>
-              </a:rPr>
-              <a:t>và</a:t>
-            </a:r>
-            <a:r>
-              <a:rPr lang="en-US" sz="2000" dirty="0">
-                <a:latin typeface="Times New Roman" panose="02020603050405020304" pitchFamily="18" charset="0"/>
-                <a:cs typeface="Times New Roman" panose="02020603050405020304" pitchFamily="18" charset="0"/>
-              </a:rPr>
-              <a:t> chi </a:t>
-            </a:r>
-            <a:r>
-              <a:rPr lang="en-US" sz="2000" dirty="0" err="1">
-                <a:latin typeface="Times New Roman" panose="02020603050405020304" pitchFamily="18" charset="0"/>
-                <a:cs typeface="Times New Roman" panose="02020603050405020304" pitchFamily="18" charset="0"/>
-              </a:rPr>
-              <a:t>phí:Ngân</a:t>
-            </a:r>
-            <a:r>
-              <a:rPr lang="en-US" sz="2000" dirty="0">
-                <a:latin typeface="Times New Roman" panose="02020603050405020304" pitchFamily="18" charset="0"/>
-                <a:cs typeface="Times New Roman" panose="02020603050405020304" pitchFamily="18" charset="0"/>
-              </a:rPr>
-              <a:t> </a:t>
-            </a:r>
-            <a:r>
-              <a:rPr lang="en-US" sz="2000" dirty="0" err="1">
-                <a:latin typeface="Times New Roman" panose="02020603050405020304" pitchFamily="18" charset="0"/>
-                <a:cs typeface="Times New Roman" panose="02020603050405020304" pitchFamily="18" charset="0"/>
-              </a:rPr>
-              <a:t>sách</a:t>
-            </a:r>
-            <a:r>
-              <a:rPr lang="en-US" sz="2000" dirty="0">
-                <a:latin typeface="Times New Roman" panose="02020603050405020304" pitchFamily="18" charset="0"/>
-                <a:cs typeface="Times New Roman" panose="02020603050405020304" pitchFamily="18" charset="0"/>
-              </a:rPr>
-              <a:t> </a:t>
-            </a:r>
-            <a:r>
-              <a:rPr lang="en-US" sz="2000" dirty="0" err="1">
-                <a:latin typeface="Times New Roman" panose="02020603050405020304" pitchFamily="18" charset="0"/>
-                <a:cs typeface="Times New Roman" panose="02020603050405020304" pitchFamily="18" charset="0"/>
-              </a:rPr>
-              <a:t>hiện</a:t>
-            </a:r>
-            <a:r>
-              <a:rPr lang="en-US" sz="2000" dirty="0">
-                <a:latin typeface="Times New Roman" panose="02020603050405020304" pitchFamily="18" charset="0"/>
-                <a:cs typeface="Times New Roman" panose="02020603050405020304" pitchFamily="18" charset="0"/>
-              </a:rPr>
-              <a:t> </a:t>
-            </a:r>
-            <a:r>
-              <a:rPr lang="en-US" sz="2000" dirty="0" err="1">
-                <a:latin typeface="Times New Roman" panose="02020603050405020304" pitchFamily="18" charset="0"/>
-                <a:cs typeface="Times New Roman" panose="02020603050405020304" pitchFamily="18" charset="0"/>
-              </a:rPr>
-              <a:t>tại</a:t>
-            </a:r>
-            <a:r>
-              <a:rPr lang="en-US" sz="2000" dirty="0">
-                <a:latin typeface="Times New Roman" panose="02020603050405020304" pitchFamily="18" charset="0"/>
-                <a:cs typeface="Times New Roman" panose="02020603050405020304" pitchFamily="18" charset="0"/>
-              </a:rPr>
-              <a:t> </a:t>
-            </a:r>
-            <a:r>
-              <a:rPr lang="en-US" sz="2000" dirty="0" err="1">
-                <a:latin typeface="Times New Roman" panose="02020603050405020304" pitchFamily="18" charset="0"/>
-                <a:cs typeface="Times New Roman" panose="02020603050405020304" pitchFamily="18" charset="0"/>
-              </a:rPr>
-              <a:t>ch</a:t>
-            </a:r>
-            <a:r>
-              <a:rPr lang="vi-VN" sz="2000" dirty="0">
-                <a:latin typeface="Times New Roman" panose="02020603050405020304" pitchFamily="18" charset="0"/>
-                <a:cs typeface="Times New Roman" panose="02020603050405020304" pitchFamily="18" charset="0"/>
-              </a:rPr>
-              <a:t>ư</a:t>
-            </a:r>
-            <a:r>
-              <a:rPr lang="en-US" sz="2000" dirty="0">
-                <a:latin typeface="Times New Roman" panose="02020603050405020304" pitchFamily="18" charset="0"/>
-                <a:cs typeface="Times New Roman" panose="02020603050405020304" pitchFamily="18" charset="0"/>
-              </a:rPr>
-              <a:t>a </a:t>
-            </a:r>
-            <a:r>
-              <a:rPr lang="en-US" sz="2000" dirty="0" err="1">
-                <a:latin typeface="Times New Roman" panose="02020603050405020304" pitchFamily="18" charset="0"/>
-                <a:cs typeface="Times New Roman" panose="02020603050405020304" pitchFamily="18" charset="0"/>
-              </a:rPr>
-              <a:t>có</a:t>
-            </a:r>
-            <a:r>
-              <a:rPr lang="en-US" sz="2000" dirty="0">
-                <a:latin typeface="Times New Roman" panose="02020603050405020304" pitchFamily="18" charset="0"/>
-                <a:cs typeface="Times New Roman" panose="02020603050405020304" pitchFamily="18" charset="0"/>
-              </a:rPr>
-              <a:t> </a:t>
-            </a:r>
-            <a:r>
-              <a:rPr lang="en-US" sz="2000" dirty="0" err="1">
-                <a:latin typeface="Times New Roman" panose="02020603050405020304" pitchFamily="18" charset="0"/>
-                <a:cs typeface="Times New Roman" panose="02020603050405020304" pitchFamily="18" charset="0"/>
-              </a:rPr>
-              <a:t>ngân</a:t>
-            </a:r>
-            <a:r>
-              <a:rPr lang="en-US" sz="2000" dirty="0">
-                <a:latin typeface="Times New Roman" panose="02020603050405020304" pitchFamily="18" charset="0"/>
-                <a:cs typeface="Times New Roman" panose="02020603050405020304" pitchFamily="18" charset="0"/>
-              </a:rPr>
-              <a:t> </a:t>
-            </a:r>
-            <a:r>
-              <a:rPr lang="en-US" sz="2000" dirty="0" err="1">
-                <a:latin typeface="Times New Roman" panose="02020603050405020304" pitchFamily="18" charset="0"/>
-                <a:cs typeface="Times New Roman" panose="02020603050405020304" pitchFamily="18" charset="0"/>
-              </a:rPr>
-              <a:t>sách</a:t>
-            </a:r>
-            <a:r>
-              <a:rPr lang="en-US" sz="2000" dirty="0">
-                <a:latin typeface="Times New Roman" panose="02020603050405020304" pitchFamily="18" charset="0"/>
-                <a:cs typeface="Times New Roman" panose="02020603050405020304" pitchFamily="18" charset="0"/>
-              </a:rPr>
-              <a:t> </a:t>
-            </a:r>
-            <a:r>
-              <a:rPr lang="en-US" sz="2000" dirty="0" err="1">
-                <a:latin typeface="Times New Roman" panose="02020603050405020304" pitchFamily="18" charset="0"/>
-                <a:cs typeface="Times New Roman" panose="02020603050405020304" pitchFamily="18" charset="0"/>
-              </a:rPr>
-              <a:t>nên</a:t>
-            </a:r>
-            <a:r>
-              <a:rPr lang="en-US" sz="2000" dirty="0">
-                <a:latin typeface="Times New Roman" panose="02020603050405020304" pitchFamily="18" charset="0"/>
-                <a:cs typeface="Times New Roman" panose="02020603050405020304" pitchFamily="18" charset="0"/>
-              </a:rPr>
-              <a:t> </a:t>
-            </a:r>
-            <a:r>
-              <a:rPr lang="en-US" sz="2000" dirty="0" err="1">
-                <a:latin typeface="Times New Roman" panose="02020603050405020304" pitchFamily="18" charset="0"/>
-                <a:cs typeface="Times New Roman" panose="02020603050405020304" pitchFamily="18" charset="0"/>
-              </a:rPr>
-              <a:t>các</a:t>
-            </a:r>
-            <a:r>
-              <a:rPr lang="en-US" sz="2000" dirty="0">
-                <a:latin typeface="Times New Roman" panose="02020603050405020304" pitchFamily="18" charset="0"/>
-                <a:cs typeface="Times New Roman" panose="02020603050405020304" pitchFamily="18" charset="0"/>
-              </a:rPr>
-              <a:t> </a:t>
-            </a:r>
-            <a:r>
-              <a:rPr lang="en-US" sz="2000" dirty="0" err="1">
-                <a:latin typeface="Times New Roman" panose="02020603050405020304" pitchFamily="18" charset="0"/>
-                <a:cs typeface="Times New Roman" panose="02020603050405020304" pitchFamily="18" charset="0"/>
-              </a:rPr>
-              <a:t>thành</a:t>
-            </a:r>
-            <a:r>
-              <a:rPr lang="en-US" sz="2000" dirty="0">
-                <a:latin typeface="Times New Roman" panose="02020603050405020304" pitchFamily="18" charset="0"/>
-                <a:cs typeface="Times New Roman" panose="02020603050405020304" pitchFamily="18" charset="0"/>
-              </a:rPr>
-              <a:t> </a:t>
-            </a:r>
-            <a:r>
-              <a:rPr lang="en-US" sz="2000" dirty="0" err="1">
-                <a:latin typeface="Times New Roman" panose="02020603050405020304" pitchFamily="18" charset="0"/>
-                <a:cs typeface="Times New Roman" panose="02020603050405020304" pitchFamily="18" charset="0"/>
-              </a:rPr>
-              <a:t>viên</a:t>
-            </a:r>
-            <a:r>
-              <a:rPr lang="en-US" sz="2000" dirty="0">
-                <a:latin typeface="Times New Roman" panose="02020603050405020304" pitchFamily="18" charset="0"/>
-                <a:cs typeface="Times New Roman" panose="02020603050405020304" pitchFamily="18" charset="0"/>
-              </a:rPr>
-              <a:t> </a:t>
-            </a:r>
-            <a:r>
-              <a:rPr lang="en-US" sz="2000" dirty="0" err="1">
-                <a:latin typeface="Times New Roman" panose="02020603050405020304" pitchFamily="18" charset="0"/>
-                <a:cs typeface="Times New Roman" panose="02020603050405020304" pitchFamily="18" charset="0"/>
-              </a:rPr>
-              <a:t>tự</a:t>
-            </a:r>
-            <a:r>
-              <a:rPr lang="en-US" sz="2000" dirty="0">
-                <a:latin typeface="Times New Roman" panose="02020603050405020304" pitchFamily="18" charset="0"/>
-                <a:cs typeface="Times New Roman" panose="02020603050405020304" pitchFamily="18" charset="0"/>
-              </a:rPr>
-              <a:t> </a:t>
-            </a:r>
-            <a:r>
-              <a:rPr lang="en-US" sz="2000" dirty="0" err="1">
-                <a:latin typeface="Times New Roman" panose="02020603050405020304" pitchFamily="18" charset="0"/>
-                <a:cs typeface="Times New Roman" panose="02020603050405020304" pitchFamily="18" charset="0"/>
-              </a:rPr>
-              <a:t>túc</a:t>
-            </a:r>
-            <a:r>
-              <a:rPr lang="en-US" sz="2000" dirty="0">
-                <a:latin typeface="Times New Roman" panose="02020603050405020304" pitchFamily="18" charset="0"/>
-                <a:cs typeface="Times New Roman" panose="02020603050405020304" pitchFamily="18" charset="0"/>
-              </a:rPr>
-              <a:t> -  Chi </a:t>
-            </a:r>
-            <a:r>
-              <a:rPr lang="en-US" sz="2000" dirty="0" err="1">
-                <a:latin typeface="Times New Roman" panose="02020603050405020304" pitchFamily="18" charset="0"/>
-                <a:cs typeface="Times New Roman" panose="02020603050405020304" pitchFamily="18" charset="0"/>
-              </a:rPr>
-              <a:t>phí</a:t>
-            </a:r>
-            <a:r>
-              <a:rPr lang="en-US" sz="2000" dirty="0">
-                <a:latin typeface="Times New Roman" panose="02020603050405020304" pitchFamily="18" charset="0"/>
-                <a:cs typeface="Times New Roman" panose="02020603050405020304" pitchFamily="18" charset="0"/>
-              </a:rPr>
-              <a:t> </a:t>
-            </a:r>
-            <a:r>
-              <a:rPr lang="en-US" sz="2000" dirty="0" err="1">
-                <a:latin typeface="Times New Roman" panose="02020603050405020304" pitchFamily="18" charset="0"/>
-                <a:cs typeface="Times New Roman" panose="02020603050405020304" pitchFamily="18" charset="0"/>
-              </a:rPr>
-              <a:t>nhóm</a:t>
-            </a:r>
-            <a:r>
-              <a:rPr lang="en-US" sz="2000" dirty="0">
-                <a:latin typeface="Times New Roman" panose="02020603050405020304" pitchFamily="18" charset="0"/>
-                <a:cs typeface="Times New Roman" panose="02020603050405020304" pitchFamily="18" charset="0"/>
-              </a:rPr>
-              <a:t> </a:t>
-            </a:r>
-            <a:r>
-              <a:rPr lang="en-US" sz="2000" dirty="0" err="1">
-                <a:latin typeface="Times New Roman" panose="02020603050405020304" pitchFamily="18" charset="0"/>
-                <a:cs typeface="Times New Roman" panose="02020603050405020304" pitchFamily="18" charset="0"/>
-              </a:rPr>
-              <a:t>là</a:t>
-            </a:r>
-            <a:r>
-              <a:rPr lang="en-US" sz="2000" dirty="0">
-                <a:latin typeface="Times New Roman" panose="02020603050405020304" pitchFamily="18" charset="0"/>
-                <a:cs typeface="Times New Roman" panose="02020603050405020304" pitchFamily="18" charset="0"/>
-              </a:rPr>
-              <a:t> </a:t>
-            </a:r>
-            <a:r>
-              <a:rPr lang="en-US" sz="2000" dirty="0" err="1">
-                <a:latin typeface="Times New Roman" panose="02020603050405020304" pitchFamily="18" charset="0"/>
-                <a:cs typeface="Times New Roman" panose="02020603050405020304" pitchFamily="18" charset="0"/>
-              </a:rPr>
-              <a:t>12tr</a:t>
-            </a:r>
-            <a:r>
-              <a:rPr lang="en-US" sz="2000" dirty="0">
-                <a:latin typeface="Times New Roman" panose="02020603050405020304" pitchFamily="18" charset="0"/>
-                <a:cs typeface="Times New Roman" panose="02020603050405020304" pitchFamily="18" charset="0"/>
-              </a:rPr>
-              <a:t> VND </a:t>
-            </a:r>
-          </a:p>
-          <a:p>
-            <a:pPr marL="0" indent="0">
-              <a:buNone/>
-            </a:pPr>
-            <a:r>
-              <a:rPr lang="vi-VN" dirty="0">
-                <a:latin typeface="Times New Roman" panose="02020603050405020304" pitchFamily="18" charset="0"/>
-                <a:cs typeface="Times New Roman" panose="02020603050405020304" pitchFamily="18" charset="0"/>
-              </a:rPr>
-              <a:t> </a:t>
-            </a:r>
-            <a:endParaRPr lang="en-US" dirty="0">
-              <a:latin typeface="Times New Roman" panose="02020603050405020304" pitchFamily="18" charset="0"/>
-              <a:cs typeface="Times New Roman" panose="02020603050405020304" pitchFamily="18" charset="0"/>
-            </a:endParaRPr>
-          </a:p>
-        </p:txBody>
-      </p:sp>
-    </p:spTree>
-    <p:extLst>
-      <p:ext uri="{BB962C8B-B14F-4D97-AF65-F5344CB8AC3E}">
-        <p14:creationId xmlns:p14="http://schemas.microsoft.com/office/powerpoint/2010/main" val="2132085301"/>
-      </p:ext>
-    </p:extLst>
-  </p:cSld>
-  <p:clrMapOvr>
-    <a:masterClrMapping/>
-  </p:clrMapOvr>
-</p:sld>
-</file>
-
-<file path=ppt/slides/slide15.xml><?xml version="1.0" encoding="utf-8"?>
-<p:sld xmlns:a="http://schemas.openxmlformats.org/drawingml/2006/main" xmlns:r="http://schemas.openxmlformats.org/officeDocument/2006/relationships" xmlns:p="http://schemas.openxmlformats.org/presentationml/2006/main">
-  <p:cSld>
-    <p:spTree>
-      <p:nvGrpSpPr>
-        <p:cNvPr id="1" name=""/>
-        <p:cNvGrpSpPr/>
-        <p:nvPr/>
-      </p:nvGrpSpPr>
-      <p:grpSpPr>
-        <a:xfrm>
-          <a:off x="0" y="0"/>
-          <a:ext cx="0" cy="0"/>
-          <a:chOff x="0" y="0"/>
-          <a:chExt cx="0" cy="0"/>
-        </a:xfrm>
-      </p:grpSpPr>
-      <p:sp>
-        <p:nvSpPr>
-          <p:cNvPr id="2" name="Title 1">
-            <a:extLst>
-              <a:ext uri="{FF2B5EF4-FFF2-40B4-BE49-F238E27FC236}">
-                <a16:creationId xmlns:a16="http://schemas.microsoft.com/office/drawing/2014/main" id="{323C768A-D3DF-4EB2-A78C-BA2018CDE498}"/>
-              </a:ext>
-            </a:extLst>
-          </p:cNvPr>
-          <p:cNvSpPr>
-            <a:spLocks noGrp="1"/>
-          </p:cNvSpPr>
-          <p:nvPr>
-            <p:ph type="title"/>
-          </p:nvPr>
-        </p:nvSpPr>
-        <p:spPr>
-          <a:xfrm>
-            <a:off x="1097280" y="286604"/>
-            <a:ext cx="10058400" cy="798126"/>
-          </a:xfrm>
-        </p:spPr>
-        <p:txBody>
-          <a:bodyPr/>
-          <a:lstStyle/>
-          <a:p>
-            <a:r>
-              <a:rPr lang="en-US" dirty="0">
-                <a:latin typeface="Times New Roman" panose="02020603050405020304" pitchFamily="18" charset="0"/>
-                <a:cs typeface="Times New Roman" panose="02020603050405020304" pitchFamily="18" charset="0"/>
-              </a:rPr>
-              <a:t>3. </a:t>
-            </a:r>
-            <a:r>
-              <a:rPr lang="en-US" dirty="0" err="1">
-                <a:latin typeface="Times New Roman" panose="02020603050405020304" pitchFamily="18" charset="0"/>
-                <a:cs typeface="Times New Roman" panose="02020603050405020304" pitchFamily="18" charset="0"/>
-              </a:rPr>
-              <a:t>Trình</a:t>
-            </a:r>
-            <a:r>
-              <a:rPr lang="en-US" dirty="0">
-                <a:latin typeface="Times New Roman" panose="02020603050405020304" pitchFamily="18" charset="0"/>
-                <a:cs typeface="Times New Roman" panose="02020603050405020304" pitchFamily="18" charset="0"/>
-              </a:rPr>
-              <a:t> </a:t>
-            </a:r>
-            <a:r>
-              <a:rPr lang="en-US" dirty="0" err="1">
-                <a:latin typeface="Times New Roman" panose="02020603050405020304" pitchFamily="18" charset="0"/>
-                <a:cs typeface="Times New Roman" panose="02020603050405020304" pitchFamily="18" charset="0"/>
-              </a:rPr>
-              <a:t>bày</a:t>
-            </a:r>
-            <a:r>
-              <a:rPr lang="en-US" dirty="0">
-                <a:latin typeface="Times New Roman" panose="02020603050405020304" pitchFamily="18" charset="0"/>
-                <a:cs typeface="Times New Roman" panose="02020603050405020304" pitchFamily="18" charset="0"/>
-              </a:rPr>
-              <a:t> </a:t>
-            </a:r>
-            <a:r>
-              <a:rPr lang="en-US" dirty="0" err="1">
-                <a:latin typeface="Times New Roman" panose="02020603050405020304" pitchFamily="18" charset="0"/>
-                <a:cs typeface="Times New Roman" panose="02020603050405020304" pitchFamily="18" charset="0"/>
-              </a:rPr>
-              <a:t>sản</a:t>
-            </a:r>
-            <a:r>
-              <a:rPr lang="en-US" dirty="0">
-                <a:latin typeface="Times New Roman" panose="02020603050405020304" pitchFamily="18" charset="0"/>
-                <a:cs typeface="Times New Roman" panose="02020603050405020304" pitchFamily="18" charset="0"/>
-              </a:rPr>
-              <a:t> </a:t>
-            </a:r>
-            <a:r>
-              <a:rPr lang="en-US" dirty="0" err="1">
-                <a:latin typeface="Times New Roman" panose="02020603050405020304" pitchFamily="18" charset="0"/>
-                <a:cs typeface="Times New Roman" panose="02020603050405020304" pitchFamily="18" charset="0"/>
-              </a:rPr>
-              <a:t>phẩm</a:t>
-            </a:r>
-            <a:endParaRPr lang="en-US" dirty="0">
-              <a:latin typeface="Times New Roman" panose="02020603050405020304" pitchFamily="18" charset="0"/>
-              <a:cs typeface="Times New Roman" panose="02020603050405020304" pitchFamily="18" charset="0"/>
-            </a:endParaRPr>
-          </a:p>
-        </p:txBody>
-      </p:sp>
-      <p:sp>
-        <p:nvSpPr>
-          <p:cNvPr id="3" name="Content Placeholder 2">
-            <a:extLst>
-              <a:ext uri="{FF2B5EF4-FFF2-40B4-BE49-F238E27FC236}">
-                <a16:creationId xmlns:a16="http://schemas.microsoft.com/office/drawing/2014/main" id="{3FA59283-35F5-4AD8-8988-F13FF907F789}"/>
-              </a:ext>
-            </a:extLst>
-          </p:cNvPr>
-          <p:cNvSpPr>
-            <a:spLocks noGrp="1"/>
-          </p:cNvSpPr>
-          <p:nvPr>
-            <p:ph idx="1"/>
-          </p:nvPr>
-        </p:nvSpPr>
-        <p:spPr/>
-        <p:txBody>
-          <a:bodyPr/>
-          <a:lstStyle/>
-          <a:p>
-            <a:r>
-              <a:rPr lang="en-US" dirty="0">
-                <a:latin typeface="Times New Roman" panose="02020603050405020304" pitchFamily="18" charset="0"/>
-                <a:cs typeface="Times New Roman" panose="02020603050405020304" pitchFamily="18" charset="0"/>
-              </a:rPr>
-              <a:t> B</a:t>
-            </a:r>
-            <a:r>
-              <a:rPr lang="vi-VN" dirty="0">
-                <a:latin typeface="Times New Roman" panose="02020603050405020304" pitchFamily="18" charset="0"/>
-                <a:cs typeface="Times New Roman" panose="02020603050405020304" pitchFamily="18" charset="0"/>
-              </a:rPr>
-              <a:t>. Các chỉ số dự đoán thời gian, chi phí khi kết thúc dự án (Forecasting) bằng phương pháp quản lý giá trị thu được (Earned value management), cập nhập sản phẩm Lịch trình dự án của nhóm. </a:t>
-            </a:r>
-            <a:endParaRPr lang="en-US" dirty="0">
-              <a:latin typeface="Times New Roman" panose="02020603050405020304" pitchFamily="18" charset="0"/>
-              <a:cs typeface="Times New Roman" panose="02020603050405020304" pitchFamily="18" charset="0"/>
-            </a:endParaRPr>
-          </a:p>
-        </p:txBody>
-      </p:sp>
-    </p:spTree>
-    <p:extLst>
-      <p:ext uri="{BB962C8B-B14F-4D97-AF65-F5344CB8AC3E}">
-        <p14:creationId xmlns:p14="http://schemas.microsoft.com/office/powerpoint/2010/main" val="1855299757"/>
-      </p:ext>
-    </p:extLst>
-  </p:cSld>
-  <p:clrMapOvr>
-    <a:masterClrMapping/>
-  </p:clrMapOvr>
-</p:sld>
-</file>
-
-<file path=ppt/slides/slide16.xml><?xml version="1.0" encoding="utf-8"?>
+<file path=ppt/slides/slide17.xml><?xml version="1.0" encoding="utf-8"?>
 <p:sld xmlns:a="http://schemas.openxmlformats.org/drawingml/2006/main" xmlns:r="http://schemas.openxmlformats.org/officeDocument/2006/relationships" xmlns:p="http://schemas.openxmlformats.org/presentationml/2006/main">
   <p:cSld>
     <p:spTree>
@@ -10038,18 +10964,25 @@
               <a:t>ư</a:t>
             </a:r>
             <a:r>
-              <a:rPr lang="en-US" dirty="0" err="1">
-                <a:latin typeface="Times New Roman" panose="02020603050405020304" pitchFamily="18" charset="0"/>
-                <a:cs typeface="Times New Roman" panose="02020603050405020304" pitchFamily="18" charset="0"/>
-              </a:rPr>
-              <a:t>ợc</a:t>
-            </a:r>
-            <a:r>
               <a:rPr lang="en-US" dirty="0">
                 <a:latin typeface="Times New Roman" panose="02020603050405020304" pitchFamily="18" charset="0"/>
                 <a:cs typeface="Times New Roman" panose="02020603050405020304" pitchFamily="18" charset="0"/>
               </a:rPr>
-              <a:t> 7/52 point</a:t>
+              <a:t>ợc </a:t>
+            </a:r>
+            <a:r>
+              <a:rPr lang="en-US" dirty="0" smtClean="0">
+                <a:latin typeface="Times New Roman" panose="02020603050405020304" pitchFamily="18" charset="0"/>
+                <a:cs typeface="Times New Roman" panose="02020603050405020304" pitchFamily="18" charset="0"/>
+              </a:rPr>
+              <a:t>18/52 </a:t>
+            </a:r>
+            <a:r>
+              <a:rPr lang="en-US" dirty="0">
+                <a:latin typeface="Times New Roman" panose="02020603050405020304" pitchFamily="18" charset="0"/>
+                <a:cs typeface="Times New Roman" panose="02020603050405020304" pitchFamily="18" charset="0"/>
+              </a:rPr>
+              <a:t>point</a:t>
             </a:r>
           </a:p>
           <a:p>
@@ -10911,7 +11844,7 @@
     </p:spTree>
     <p:extLst>
       <p:ext uri="{BB962C8B-B14F-4D97-AF65-F5344CB8AC3E}">
-        <p14:creationId xmlns:p14="http://schemas.microsoft.com/office/powerpoint/2010/main" val="1687052069"/>
+        <p14:creationId xmlns:p14="http://schemas.microsoft.com/office/powerpoint/2010/main" val="762518623"/>
       </p:ext>
     </p:extLst>
   </p:cSld>
@@ -10921,7 +11854,7 @@
 </p:sld>
 </file>
 
-<file path=ppt/slides/slide17.xml><?xml version="1.0" encoding="utf-8"?>
+<file path=ppt/slides/slide18.xml><?xml version="1.0" encoding="utf-8"?>
 <p:sld xmlns:a="http://schemas.openxmlformats.org/drawingml/2006/main" xmlns:r="http://schemas.openxmlformats.org/officeDocument/2006/relationships" xmlns:p="http://schemas.openxmlformats.org/presentationml/2006/main">
   <p:cSld>
     <p:bg>
@@ -13001,8 +13934,19 @@
                 <a:latin typeface="Times New Roman" panose="02020603050405020304" pitchFamily="18" charset="0"/>
                 <a:cs typeface="Times New Roman" panose="02020603050405020304" pitchFamily="18" charset="0"/>
               </a:rPr>
-              <a:t>Tình trang dự án hiện tại vẫn diễn ra bình thường</a:t>
-            </a:r>
+              <a:t>Tình trang dự án hiện tại </a:t>
+            </a:r>
+            <a:r>
+              <a:rPr lang="en-US" dirty="0" smtClean="0">
+                <a:latin typeface="Times New Roman" panose="02020603050405020304" pitchFamily="18" charset="0"/>
+                <a:cs typeface="Times New Roman" panose="02020603050405020304" pitchFamily="18" charset="0"/>
+              </a:rPr>
+              <a:t>đang ở mức thủ thách</a:t>
+            </a:r>
+            <a:endParaRPr lang="en-US" dirty="0" smtClean="0">
+              <a:latin typeface="Times New Roman" panose="02020603050405020304" pitchFamily="18" charset="0"/>
+              <a:cs typeface="Times New Roman" panose="02020603050405020304" pitchFamily="18" charset="0"/>
+            </a:endParaRPr>
           </a:p>
           <a:p>
             <a:r>

</xml_diff>